<commit_message>
Update 4. Programación Lineal.pptx
</commit_message>
<xml_diff>
--- a/1. Lectures/Introducción a la Optimización aplicada a Sistemas de Energía Eléctrica/Dia 1/4. Programación Lineal.pptx
+++ b/1. Lectures/Introducción a la Optimización aplicada a Sistemas de Energía Eléctrica/Dia 1/4. Programación Lineal.pptx
@@ -5,19 +5,17 @@
     <p:sldMasterId id="2147483732" r:id="rId1"/>
   </p:sldMasterIdLst>
   <p:notesMasterIdLst>
-    <p:notesMasterId r:id="rId9"/>
+    <p:notesMasterId r:id="rId7"/>
   </p:notesMasterIdLst>
   <p:handoutMasterIdLst>
-    <p:handoutMasterId r:id="rId10"/>
+    <p:handoutMasterId r:id="rId8"/>
   </p:handoutMasterIdLst>
   <p:sldIdLst>
     <p:sldId id="256" r:id="rId2"/>
-    <p:sldId id="422" r:id="rId3"/>
-    <p:sldId id="423" r:id="rId4"/>
-    <p:sldId id="424" r:id="rId5"/>
-    <p:sldId id="425" r:id="rId6"/>
-    <p:sldId id="258" r:id="rId7"/>
-    <p:sldId id="305" r:id="rId8"/>
+    <p:sldId id="425" r:id="rId3"/>
+    <p:sldId id="422" r:id="rId4"/>
+    <p:sldId id="423" r:id="rId5"/>
+    <p:sldId id="305" r:id="rId6"/>
   </p:sldIdLst>
   <p:sldSz cx="9144000" cy="6858000" type="screen4x3"/>
   <p:notesSz cx="6858000" cy="9144000"/>
@@ -122,11 +120,9 @@
         <p14:section name="Sección sin título" id="{AD9E8953-8F23-4120-BF77-142A552BAF20}">
           <p14:sldIdLst>
             <p14:sldId id="256"/>
+            <p14:sldId id="425"/>
             <p14:sldId id="422"/>
             <p14:sldId id="423"/>
-            <p14:sldId id="424"/>
-            <p14:sldId id="425"/>
-            <p14:sldId id="258"/>
             <p14:sldId id="305"/>
           </p14:sldIdLst>
         </p14:section>
@@ -236,7 +232,7 @@
             <a:fld id="{20597DA6-5F4F-42D3-8A01-E860A9714D40}" type="datetimeFigureOut">
               <a:rPr lang="es-ES" smtClean="0"/>
               <a:pPr/>
-              <a:t>13/03/2019</a:t>
+              <a:t>14/03/2019</a:t>
             </a:fld>
             <a:endParaRPr lang="es-ES"/>
           </a:p>
@@ -303,7 +299,7 @@
             <a:fld id="{27A565BD-2940-4473-877F-C1308FF5E531}" type="slidenum">
               <a:rPr lang="es-ES" smtClean="0"/>
               <a:pPr/>
-              <a:t>‹#›</a:t>
+              <a:t>‹Nº›</a:t>
             </a:fld>
             <a:endParaRPr lang="es-ES"/>
           </a:p>
@@ -407,7 +403,7 @@
             <a:fld id="{D23D6ABD-B407-4DBB-94E4-3909D8A64036}" type="datetimeFigureOut">
               <a:rPr lang="es-ES" smtClean="0"/>
               <a:pPr/>
-              <a:t>13/03/2019</a:t>
+              <a:t>14/03/2019</a:t>
             </a:fld>
             <a:endParaRPr lang="es-ES"/>
           </a:p>
@@ -566,7 +562,7 @@
             <a:fld id="{8AD6E850-6E96-4E89-86F1-2DE46BB95531}" type="slidenum">
               <a:rPr lang="es-ES" smtClean="0"/>
               <a:pPr/>
-              <a:t>‹#›</a:t>
+              <a:t>‹Nº›</a:t>
             </a:fld>
             <a:endParaRPr lang="es-ES"/>
           </a:p>
@@ -783,113 +779,6 @@
 </p:notes>
 </file>
 
-<file path=ppt/notesSlides/notesSlide2.xml><?xml version="1.0" encoding="utf-8"?>
-<p:notes xmlns:a="http://schemas.openxmlformats.org/drawingml/2006/main" xmlns:r="http://schemas.openxmlformats.org/officeDocument/2006/relationships" xmlns:p="http://schemas.openxmlformats.org/presentationml/2006/main">
-  <p:cSld>
-    <p:spTree>
-      <p:nvGrpSpPr>
-        <p:cNvPr id="1" name=""/>
-        <p:cNvGrpSpPr/>
-        <p:nvPr/>
-      </p:nvGrpSpPr>
-      <p:grpSpPr>
-        <a:xfrm>
-          <a:off x="0" y="0"/>
-          <a:ext cx="0" cy="0"/>
-          <a:chOff x="0" y="0"/>
-          <a:chExt cx="0" cy="0"/>
-        </a:xfrm>
-      </p:grpSpPr>
-      <p:sp>
-        <p:nvSpPr>
-          <p:cNvPr id="2" name="1 Marcador de imagen de diapositiva"/>
-          <p:cNvSpPr>
-            <a:spLocks noGrp="1" noRot="1" noChangeAspect="1"/>
-          </p:cNvSpPr>
-          <p:nvPr>
-            <p:ph type="sldImg"/>
-          </p:nvPr>
-        </p:nvSpPr>
-        <p:spPr/>
-      </p:sp>
-      <p:sp>
-        <p:nvSpPr>
-          <p:cNvPr id="3" name="2 Marcador de notas"/>
-          <p:cNvSpPr>
-            <a:spLocks noGrp="1"/>
-          </p:cNvSpPr>
-          <p:nvPr>
-            <p:ph type="body" idx="1"/>
-          </p:nvPr>
-        </p:nvSpPr>
-        <p:spPr/>
-        <p:txBody>
-          <a:bodyPr/>
-          <a:lstStyle/>
-          <a:p>
-            <a:endParaRPr lang="es-ES" dirty="0"/>
-          </a:p>
-        </p:txBody>
-      </p:sp>
-      <p:sp>
-        <p:nvSpPr>
-          <p:cNvPr id="4" name="3 Marcador de número de diapositiva"/>
-          <p:cNvSpPr>
-            <a:spLocks noGrp="1"/>
-          </p:cNvSpPr>
-          <p:nvPr>
-            <p:ph type="sldNum" sz="quarter" idx="10"/>
-          </p:nvPr>
-        </p:nvSpPr>
-        <p:spPr/>
-        <p:txBody>
-          <a:bodyPr/>
-          <a:lstStyle/>
-          <a:p>
-            <a:fld id="{8AD6E850-6E96-4E89-86F1-2DE46BB95531}" type="slidenum">
-              <a:rPr lang="es-ES" smtClean="0"/>
-              <a:pPr/>
-              <a:t>6</a:t>
-            </a:fld>
-            <a:endParaRPr lang="es-ES"/>
-          </a:p>
-        </p:txBody>
-      </p:sp>
-      <p:sp>
-        <p:nvSpPr>
-          <p:cNvPr id="5" name="4 Marcador de encabezado"/>
-          <p:cNvSpPr>
-            <a:spLocks noGrp="1"/>
-          </p:cNvSpPr>
-          <p:nvPr>
-            <p:ph type="hdr" sz="quarter" idx="11"/>
-          </p:nvPr>
-        </p:nvSpPr>
-        <p:spPr/>
-        <p:txBody>
-          <a:bodyPr/>
-          <a:lstStyle/>
-          <a:p>
-            <a:r>
-              <a:rPr lang="es-ES"/>
-              <a:t>Proyecto CanSat</a:t>
-            </a:r>
-          </a:p>
-        </p:txBody>
-      </p:sp>
-    </p:spTree>
-    <p:extLst>
-      <p:ext uri="{BB962C8B-B14F-4D97-AF65-F5344CB8AC3E}">
-        <p14:creationId xmlns:p14="http://schemas.microsoft.com/office/powerpoint/2010/main" val="2568092354"/>
-      </p:ext>
-    </p:extLst>
-  </p:cSld>
-  <p:clrMapOvr>
-    <a:masterClrMapping/>
-  </p:clrMapOvr>
-</p:notes>
-</file>
-
 <file path=ppt/slideLayouts/slideLayout1.xml><?xml version="1.0" encoding="utf-8"?>
 <p:sldLayout xmlns:a="http://schemas.openxmlformats.org/drawingml/2006/main" xmlns:r="http://schemas.openxmlformats.org/officeDocument/2006/relationships" xmlns:p="http://schemas.openxmlformats.org/presentationml/2006/main" type="title" preserve="1">
   <p:cSld name="Diapositiva de título">
@@ -1095,7 +984,7 @@
             <a:fld id="{64BD7E74-CBD2-4D88-9109-2EA8081AE675}" type="slidenum">
               <a:rPr lang="es-ES" smtClean="0"/>
               <a:pPr/>
-              <a:t>‹#›</a:t>
+              <a:t>‹Nº›</a:t>
             </a:fld>
             <a:endParaRPr lang="es-ES"/>
           </a:p>
@@ -1525,7 +1414,7 @@
             <a:fld id="{64BD7E74-CBD2-4D88-9109-2EA8081AE675}" type="slidenum">
               <a:rPr lang="es-ES" smtClean="0"/>
               <a:pPr/>
-              <a:t>‹#›</a:t>
+              <a:t>‹Nº›</a:t>
             </a:fld>
             <a:endParaRPr lang="es-ES"/>
           </a:p>
@@ -1716,7 +1605,7 @@
             <a:fld id="{64BD7E74-CBD2-4D88-9109-2EA8081AE675}" type="slidenum">
               <a:rPr lang="es-ES" smtClean="0"/>
               <a:pPr/>
-              <a:t>‹#›</a:t>
+              <a:t>‹Nº›</a:t>
             </a:fld>
             <a:endParaRPr lang="es-ES"/>
           </a:p>
@@ -1854,7 +1743,7 @@
             <a:fld id="{64BD7E74-CBD2-4D88-9109-2EA8081AE675}" type="slidenum">
               <a:rPr lang="es-ES" smtClean="0"/>
               <a:pPr/>
-              <a:t>‹#›</a:t>
+              <a:t>‹Nº›</a:t>
             </a:fld>
             <a:endParaRPr lang="es-ES"/>
           </a:p>
@@ -2375,7 +2264,7 @@
             <a:fld id="{64BD7E74-CBD2-4D88-9109-2EA8081AE675}" type="slidenum">
               <a:rPr lang="es-ES" smtClean="0"/>
               <a:pPr/>
-              <a:t>‹#›</a:t>
+              <a:t>‹Nº›</a:t>
             </a:fld>
             <a:endParaRPr lang="es-ES"/>
           </a:p>
@@ -2504,7 +2393,7 @@
             <a:fld id="{64BD7E74-CBD2-4D88-9109-2EA8081AE675}" type="slidenum">
               <a:rPr lang="es-ES" smtClean="0"/>
               <a:pPr/>
-              <a:t>‹#›</a:t>
+              <a:t>‹Nº›</a:t>
             </a:fld>
             <a:endParaRPr lang="es-ES"/>
           </a:p>
@@ -2882,7 +2771,7 @@
             <a:fld id="{64BD7E74-CBD2-4D88-9109-2EA8081AE675}" type="slidenum">
               <a:rPr lang="es-ES" smtClean="0"/>
               <a:pPr/>
-              <a:t>‹#›</a:t>
+              <a:t>‹Nº›</a:t>
             </a:fld>
             <a:endParaRPr lang="es-ES"/>
           </a:p>
@@ -3135,7 +3024,7 @@
             <a:fld id="{64BD7E74-CBD2-4D88-9109-2EA8081AE675}" type="slidenum">
               <a:rPr lang="es-ES" smtClean="0"/>
               <a:pPr/>
-              <a:t>‹#›</a:t>
+              <a:t>‹Nº›</a:t>
             </a:fld>
             <a:endParaRPr lang="es-ES"/>
           </a:p>
@@ -3271,7 +3160,7 @@
             <a:fld id="{64BD7E74-CBD2-4D88-9109-2EA8081AE675}" type="slidenum">
               <a:rPr lang="es-ES" smtClean="0"/>
               <a:pPr/>
-              <a:t>‹#›</a:t>
+              <a:t>‹Nº›</a:t>
             </a:fld>
             <a:endParaRPr lang="es-ES"/>
           </a:p>
@@ -3554,7 +3443,7 @@
             <a:fld id="{64BD7E74-CBD2-4D88-9109-2EA8081AE675}" type="slidenum">
               <a:rPr lang="es-ES" smtClean="0"/>
               <a:pPr/>
-              <a:t>‹#›</a:t>
+              <a:t>‹Nº›</a:t>
             </a:fld>
             <a:endParaRPr lang="es-ES"/>
           </a:p>
@@ -3803,7 +3692,7 @@
             <a:fld id="{64BD7E74-CBD2-4D88-9109-2EA8081AE675}" type="slidenum">
               <a:rPr lang="es-ES" smtClean="0"/>
               <a:pPr/>
-              <a:t>‹#›</a:t>
+              <a:t>‹Nº›</a:t>
             </a:fld>
             <a:endParaRPr lang="es-ES"/>
           </a:p>
@@ -4275,7 +4164,7 @@
             <a:fld id="{64BD7E74-CBD2-4D88-9109-2EA8081AE675}" type="slidenum">
               <a:rPr lang="es-ES" smtClean="0"/>
               <a:pPr/>
-              <a:t>‹#›</a:t>
+              <a:t>‹Nº›</a:t>
             </a:fld>
             <a:endParaRPr lang="es-ES" dirty="0"/>
           </a:p>
@@ -4433,6 +4322,36 @@
             <a:ext cx="704761" cy="576064"/>
           </a:xfrm>
           <a:prstGeom prst="ellipse">
+            <a:avLst/>
+          </a:prstGeom>
+        </p:spPr>
+      </p:pic>
+      <p:pic>
+        <p:nvPicPr>
+          <p:cNvPr id="12" name="Imagen 11"/>
+          <p:cNvPicPr>
+            <a:picLocks noChangeAspect="1"/>
+          </p:cNvPicPr>
+          <p:nvPr userDrawn="1"/>
+        </p:nvPicPr>
+        <p:blipFill>
+          <a:blip r:embed="rId15" cstate="print">
+            <a:extLst>
+              <a:ext uri="{28A0092B-C50C-407E-A947-70E740481C1C}">
+                <a14:useLocalDpi xmlns:a14="http://schemas.microsoft.com/office/drawing/2010/main" val="0"/>
+              </a:ext>
+            </a:extLst>
+          </a:blip>
+          <a:stretch>
+            <a:fillRect/>
+          </a:stretch>
+        </p:blipFill>
+        <p:spPr>
+          <a:xfrm>
+            <a:off x="8390077" y="6146157"/>
+            <a:ext cx="582303" cy="539229"/>
+          </a:xfrm>
+          <a:prstGeom prst="rect">
             <a:avLst/>
           </a:prstGeom>
         </p:spPr>
@@ -4780,113 +4699,15 @@
           <a:lstStyle/>
           <a:p>
             <a:r>
-              <a:rPr lang="en-US" sz="2400" kern="1400" cap="small" dirty="0" err="1">
+              <a:rPr lang="es-PE" sz="2400" kern="1400" cap="small" dirty="0">
                 <a:solidFill>
                   <a:schemeClr val="bg1"/>
                 </a:solidFill>
                 <a:latin typeface="Bookman Old Style" panose="02050604050505020204" pitchFamily="18" charset="0"/>
               </a:rPr>
-              <a:t>Introducción</a:t>
-            </a:r>
-            <a:r>
-              <a:rPr lang="en-US" sz="2400" kern="1400" cap="small" dirty="0">
-                <a:solidFill>
-                  <a:schemeClr val="bg1"/>
-                </a:solidFill>
-                <a:latin typeface="Bookman Old Style" panose="02050604050505020204" pitchFamily="18" charset="0"/>
-              </a:rPr>
-              <a:t> a la </a:t>
-            </a:r>
-            <a:r>
-              <a:rPr lang="en-US" sz="2400" kern="1400" cap="small" dirty="0" err="1">
-                <a:solidFill>
-                  <a:schemeClr val="bg1"/>
-                </a:solidFill>
-                <a:latin typeface="Bookman Old Style" panose="02050604050505020204" pitchFamily="18" charset="0"/>
-              </a:rPr>
-              <a:t>Optimización</a:t>
-            </a:r>
-            <a:r>
-              <a:rPr lang="en-US" sz="2400" kern="1400" cap="small" dirty="0">
-                <a:solidFill>
-                  <a:schemeClr val="bg1"/>
-                </a:solidFill>
-                <a:latin typeface="Bookman Old Style" panose="02050604050505020204" pitchFamily="18" charset="0"/>
-              </a:rPr>
-              <a:t> </a:t>
-            </a:r>
-            <a:br>
-              <a:rPr lang="en-US" sz="2400" kern="1400" cap="small" dirty="0">
-                <a:solidFill>
-                  <a:schemeClr val="bg1"/>
-                </a:solidFill>
-                <a:latin typeface="Bookman Old Style" panose="02050604050505020204" pitchFamily="18" charset="0"/>
-              </a:rPr>
-            </a:br>
-            <a:r>
-              <a:rPr lang="en-US" sz="2400" kern="1400" cap="small" dirty="0" err="1">
-                <a:solidFill>
-                  <a:schemeClr val="bg1"/>
-                </a:solidFill>
-                <a:latin typeface="Bookman Old Style" panose="02050604050505020204" pitchFamily="18" charset="0"/>
-              </a:rPr>
-              <a:t>en</a:t>
-            </a:r>
-            <a:r>
-              <a:rPr lang="en-US" sz="2400" kern="1400" cap="small" dirty="0">
-                <a:solidFill>
-                  <a:schemeClr val="bg1"/>
-                </a:solidFill>
-                <a:latin typeface="Bookman Old Style" panose="02050604050505020204" pitchFamily="18" charset="0"/>
-              </a:rPr>
-              <a:t> </a:t>
-            </a:r>
-            <a:r>
-              <a:rPr lang="en-US" sz="2400" kern="1400" cap="small" dirty="0" err="1">
-                <a:solidFill>
-                  <a:schemeClr val="bg1"/>
-                </a:solidFill>
-                <a:latin typeface="Bookman Old Style" panose="02050604050505020204" pitchFamily="18" charset="0"/>
-              </a:rPr>
-              <a:t>Sistemas</a:t>
-            </a:r>
-            <a:r>
-              <a:rPr lang="en-US" sz="2400" kern="1400" cap="small" dirty="0">
-                <a:solidFill>
-                  <a:schemeClr val="bg1"/>
-                </a:solidFill>
-                <a:latin typeface="Bookman Old Style" panose="02050604050505020204" pitchFamily="18" charset="0"/>
-              </a:rPr>
-              <a:t> </a:t>
-            </a:r>
-            <a:r>
-              <a:rPr lang="en-US" sz="2400" kern="1400" cap="small" dirty="0" err="1">
-                <a:solidFill>
-                  <a:schemeClr val="bg1"/>
-                </a:solidFill>
-                <a:latin typeface="Bookman Old Style" panose="02050604050505020204" pitchFamily="18" charset="0"/>
-              </a:rPr>
-              <a:t>Eléctricos</a:t>
-            </a:r>
-            <a:r>
-              <a:rPr lang="en-US" sz="2400" kern="1400" cap="small" dirty="0">
-                <a:solidFill>
-                  <a:schemeClr val="bg1"/>
-                </a:solidFill>
-                <a:latin typeface="Bookman Old Style" panose="02050604050505020204" pitchFamily="18" charset="0"/>
-              </a:rPr>
-              <a:t> de </a:t>
-            </a:r>
-            <a:r>
-              <a:rPr lang="en-US" sz="2400" kern="1400" cap="small" dirty="0" err="1">
-                <a:solidFill>
-                  <a:schemeClr val="bg1"/>
-                </a:solidFill>
-                <a:latin typeface="Bookman Old Style" panose="02050604050505020204" pitchFamily="18" charset="0"/>
-              </a:rPr>
-              <a:t>Potencia</a:t>
-            </a:r>
-            <a:endParaRPr lang="es-ES" sz="2400" cap="small" dirty="0">
+              <a:t>Programación Lineal</a:t>
+            </a:r>
+            <a:endParaRPr lang="es-PE" sz="2400" cap="small" dirty="0">
               <a:solidFill>
                 <a:schemeClr val="bg1"/>
               </a:solidFill>
@@ -5108,8 +4929,8 @@
         </p:nvSpPr>
         <p:spPr>
           <a:xfrm>
-            <a:off x="3383691" y="355303"/>
-            <a:ext cx="2521844" cy="769441"/>
+            <a:off x="3775625" y="355303"/>
+            <a:ext cx="1737976" cy="769441"/>
           </a:xfrm>
           <a:prstGeom prst="rect">
             <a:avLst/>
@@ -5123,10 +4944,10 @@
           <a:lstStyle/>
           <a:p>
             <a:r>
-              <a:rPr lang="en-US" sz="4400" dirty="0">
+              <a:rPr lang="es-PE" sz="4400" dirty="0">
                 <a:latin typeface="Old English Text MT" panose="03040902040508030806" pitchFamily="66" charset="0"/>
               </a:rPr>
-              <a:t>Workshop</a:t>
+              <a:t>Tópico</a:t>
             </a:r>
           </a:p>
         </p:txBody>
@@ -5547,7 +5368,7 @@
           <a:p>
             <a:r>
               <a:rPr lang="es-PE" altLang="en-US" dirty="0"/>
-              <a:t>Programación lineal</a:t>
+              <a:t>Programación lineal: Formulación</a:t>
             </a:r>
           </a:p>
         </p:txBody>
@@ -5566,8 +5387,8 @@
         </p:nvSpPr>
         <p:spPr>
           <a:xfrm>
-            <a:off x="602191" y="2431916"/>
-            <a:ext cx="8362297" cy="4093428"/>
+            <a:off x="602191" y="836712"/>
+            <a:ext cx="8002257" cy="400110"/>
           </a:xfrm>
           <a:prstGeom prst="rect">
             <a:avLst/>
@@ -5586,7 +5407,537 @@
             </a:pPr>
             <a:r>
               <a:rPr lang="es-MX" sz="2000" dirty="0"/>
-              <a:t>Método simplex primal y dual.</a:t>
+              <a:t>Cualquier PL puede ser colocado en una forma estándar</a:t>
+            </a:r>
+          </a:p>
+        </p:txBody>
+      </p:sp>
+      <p:pic>
+        <p:nvPicPr>
+          <p:cNvPr id="4" name="Picture 3">
+            <a:extLst>
+              <a:ext uri="{FF2B5EF4-FFF2-40B4-BE49-F238E27FC236}">
+                <a16:creationId xmlns:a16="http://schemas.microsoft.com/office/drawing/2014/main" id="{641CC9DB-45FA-4FCD-8114-BE417D42F78A}"/>
+              </a:ext>
+            </a:extLst>
+          </p:cNvPr>
+          <p:cNvPicPr>
+            <a:picLocks noChangeAspect="1"/>
+          </p:cNvPicPr>
+          <p:nvPr/>
+        </p:nvPicPr>
+        <p:blipFill>
+          <a:blip r:embed="rId2"/>
+          <a:stretch>
+            <a:fillRect/>
+          </a:stretch>
+        </p:blipFill>
+        <p:spPr>
+          <a:xfrm>
+            <a:off x="1331205" y="1228066"/>
+            <a:ext cx="6544228" cy="2451052"/>
+          </a:xfrm>
+          <a:prstGeom prst="rect">
+            <a:avLst/>
+          </a:prstGeom>
+        </p:spPr>
+      </p:pic>
+      <mc:AlternateContent xmlns:mc="http://schemas.openxmlformats.org/markup-compatibility/2006">
+        <mc:Choice xmlns:a14="http://schemas.microsoft.com/office/drawing/2010/main" Requires="a14">
+          <p:sp>
+            <p:nvSpPr>
+              <p:cNvPr id="8" name="CuadroTexto 4">
+                <a:extLst>
+                  <a:ext uri="{FF2B5EF4-FFF2-40B4-BE49-F238E27FC236}">
+                    <a16:creationId xmlns:a16="http://schemas.microsoft.com/office/drawing/2014/main" id="{F31C097F-38DA-47AA-BEDF-8AA58B8B2848}"/>
+                  </a:ext>
+                </a:extLst>
+              </p:cNvPr>
+              <p:cNvSpPr txBox="1"/>
+              <p:nvPr/>
+            </p:nvSpPr>
+            <p:spPr>
+              <a:xfrm>
+                <a:off x="602191" y="3870417"/>
+                <a:ext cx="8002257" cy="1040349"/>
+              </a:xfrm>
+              <a:prstGeom prst="rect">
+                <a:avLst/>
+              </a:prstGeom>
+              <a:noFill/>
+            </p:spPr>
+            <p:txBody>
+              <a:bodyPr wrap="square" rtlCol="0">
+                <a:spAutoFit/>
+              </a:bodyPr>
+              <a:lstStyle/>
+              <a:p>
+                <a:pPr marL="285750" indent="-285750">
+                  <a:buFont typeface="Arial" panose="020B0604020202020204" pitchFamily="34" charset="0"/>
+                  <a:buChar char="•"/>
+                </a:pPr>
+                <a:r>
+                  <a:rPr lang="es-MX" sz="2000" dirty="0"/>
+                  <a:t>Las constantes </a:t>
+                </a:r>
+                <a14:m>
+                  <m:oMath xmlns:m="http://schemas.openxmlformats.org/officeDocument/2006/math">
+                    <m:sSub>
+                      <m:sSubPr>
+                        <m:ctrlPr>
+                          <a:rPr lang="es-MX" sz="2000" i="1" smtClean="0">
+                            <a:latin typeface="Cambria Math" panose="02040503050406030204" pitchFamily="18" charset="0"/>
+                          </a:rPr>
+                        </m:ctrlPr>
+                      </m:sSubPr>
+                      <m:e>
+                        <m:r>
+                          <a:rPr lang="es-PE" sz="2000" b="0" i="1" smtClean="0">
+                            <a:latin typeface="Cambria Math" panose="02040503050406030204" pitchFamily="18" charset="0"/>
+                          </a:rPr>
+                          <m:t>𝑐</m:t>
+                        </m:r>
+                      </m:e>
+                      <m:sub>
+                        <m:r>
+                          <a:rPr lang="es-PE" sz="2000" b="0" i="1" smtClean="0">
+                            <a:latin typeface="Cambria Math" panose="02040503050406030204" pitchFamily="18" charset="0"/>
+                          </a:rPr>
+                          <m:t>𝑗</m:t>
+                        </m:r>
+                      </m:sub>
+                    </m:sSub>
+                    <m:r>
+                      <a:rPr lang="es-PE" sz="2000" b="0" i="1" smtClean="0">
+                        <a:latin typeface="Cambria Math" panose="02040503050406030204" pitchFamily="18" charset="0"/>
+                      </a:rPr>
+                      <m:t>,</m:t>
+                    </m:r>
+                    <m:sSub>
+                      <m:sSubPr>
+                        <m:ctrlPr>
+                          <a:rPr lang="es-MX" sz="2000" i="1">
+                            <a:latin typeface="Cambria Math" panose="02040503050406030204" pitchFamily="18" charset="0"/>
+                          </a:rPr>
+                        </m:ctrlPr>
+                      </m:sSubPr>
+                      <m:e>
+                        <m:r>
+                          <a:rPr lang="es-PE" sz="2000" b="0" i="1" smtClean="0">
+                            <a:latin typeface="Cambria Math" panose="02040503050406030204" pitchFamily="18" charset="0"/>
+                          </a:rPr>
+                          <m:t>𝑏</m:t>
+                        </m:r>
+                      </m:e>
+                      <m:sub>
+                        <m:r>
+                          <a:rPr lang="es-PE" sz="2000" b="0" i="1" smtClean="0">
+                            <a:latin typeface="Cambria Math" panose="02040503050406030204" pitchFamily="18" charset="0"/>
+                          </a:rPr>
+                          <m:t>𝑖</m:t>
+                        </m:r>
+                      </m:sub>
+                    </m:sSub>
+                  </m:oMath>
+                </a14:m>
+                <a:r>
+                  <a:rPr lang="es-MX" sz="2000" dirty="0"/>
+                  <a:t> y </a:t>
+                </a:r>
+                <a14:m>
+                  <m:oMath xmlns:m="http://schemas.openxmlformats.org/officeDocument/2006/math">
+                    <m:sSub>
+                      <m:sSubPr>
+                        <m:ctrlPr>
+                          <a:rPr lang="es-MX" sz="2000" i="1" smtClean="0">
+                            <a:latin typeface="Cambria Math" panose="02040503050406030204" pitchFamily="18" charset="0"/>
+                          </a:rPr>
+                        </m:ctrlPr>
+                      </m:sSubPr>
+                      <m:e>
+                        <m:r>
+                          <a:rPr lang="es-PE" sz="2000" b="0" i="1" smtClean="0">
+                            <a:latin typeface="Cambria Math" panose="02040503050406030204" pitchFamily="18" charset="0"/>
+                          </a:rPr>
+                          <m:t>𝑎</m:t>
+                        </m:r>
+                      </m:e>
+                      <m:sub>
+                        <m:r>
+                          <a:rPr lang="es-PE" sz="2000" b="0" i="1" smtClean="0">
+                            <a:latin typeface="Cambria Math" panose="02040503050406030204" pitchFamily="18" charset="0"/>
+                          </a:rPr>
+                          <m:t>𝑖</m:t>
+                        </m:r>
+                        <m:r>
+                          <a:rPr lang="es-PE" sz="2000" i="1">
+                            <a:latin typeface="Cambria Math" panose="02040503050406030204" pitchFamily="18" charset="0"/>
+                          </a:rPr>
+                          <m:t>𝑗</m:t>
+                        </m:r>
+                      </m:sub>
+                    </m:sSub>
+                  </m:oMath>
+                </a14:m>
+                <a:r>
+                  <a:rPr lang="es-MX" sz="2000" dirty="0"/>
+                  <a:t>, </a:t>
+                </a:r>
+                <a14:m>
+                  <m:oMath xmlns:m="http://schemas.openxmlformats.org/officeDocument/2006/math">
+                    <m:r>
+                      <a:rPr lang="es-PE" sz="2000" i="1">
+                        <a:latin typeface="Cambria Math" panose="02040503050406030204" pitchFamily="18" charset="0"/>
+                      </a:rPr>
+                      <m:t>𝑖</m:t>
+                    </m:r>
+                    <m:r>
+                      <a:rPr lang="es-PE" sz="2000" i="1">
+                        <a:latin typeface="Cambria Math" panose="02040503050406030204" pitchFamily="18" charset="0"/>
+                      </a:rPr>
+                      <m:t>=1,2,…,</m:t>
+                    </m:r>
+                    <m:r>
+                      <a:rPr lang="es-PE" sz="2000" b="0" i="1" smtClean="0">
+                        <a:latin typeface="Cambria Math" panose="02040503050406030204" pitchFamily="18" charset="0"/>
+                      </a:rPr>
+                      <m:t>𝑚</m:t>
+                    </m:r>
+                  </m:oMath>
+                </a14:m>
+                <a:r>
+                  <a:rPr lang="es-MX" sz="2000" dirty="0"/>
+                  <a:t> </a:t>
+                </a:r>
+                <a14:m>
+                  <m:oMath xmlns:m="http://schemas.openxmlformats.org/officeDocument/2006/math">
+                    <m:r>
+                      <a:rPr lang="es-PE" sz="2000" b="0" i="0" smtClean="0">
+                        <a:latin typeface="Cambria Math" panose="02040503050406030204" pitchFamily="18" charset="0"/>
+                      </a:rPr>
+                      <m:t> </m:t>
+                    </m:r>
+                    <m:r>
+                      <a:rPr lang="es-PE" sz="2000" b="0" i="0" smtClean="0">
+                        <a:latin typeface="Cambria Math" panose="02040503050406030204" pitchFamily="18" charset="0"/>
+                      </a:rPr>
+                      <m:t>&amp;</m:t>
+                    </m:r>
+                    <m:r>
+                      <a:rPr lang="es-PE" sz="2000" b="0" i="0" smtClean="0">
+                        <a:latin typeface="Cambria Math" panose="02040503050406030204" pitchFamily="18" charset="0"/>
+                      </a:rPr>
+                      <m:t>   </m:t>
+                    </m:r>
+                    <m:r>
+                      <a:rPr lang="es-PE" sz="2000" b="0" i="1" smtClean="0">
+                        <a:latin typeface="Cambria Math" panose="02040503050406030204" pitchFamily="18" charset="0"/>
+                      </a:rPr>
+                      <m:t>𝑗</m:t>
+                    </m:r>
+                    <m:r>
+                      <a:rPr lang="es-PE" sz="2000" i="1">
+                        <a:latin typeface="Cambria Math" panose="02040503050406030204" pitchFamily="18" charset="0"/>
+                      </a:rPr>
+                      <m:t>=1,</m:t>
+                    </m:r>
+                    <m:r>
+                      <a:rPr lang="es-PE" sz="2000" b="0" i="1" smtClean="0">
+                        <a:latin typeface="Cambria Math" panose="02040503050406030204" pitchFamily="18" charset="0"/>
+                      </a:rPr>
+                      <m:t>2,</m:t>
+                    </m:r>
+                    <m:r>
+                      <a:rPr lang="es-PE" sz="2000" i="1">
+                        <a:latin typeface="Cambria Math" panose="02040503050406030204" pitchFamily="18" charset="0"/>
+                      </a:rPr>
+                      <m:t>…,</m:t>
+                    </m:r>
+                    <m:r>
+                      <a:rPr lang="es-PE" sz="2000" i="1">
+                        <a:latin typeface="Cambria Math" panose="02040503050406030204" pitchFamily="18" charset="0"/>
+                      </a:rPr>
+                      <m:t>𝑛</m:t>
+                    </m:r>
+                  </m:oMath>
+                </a14:m>
+                <a:r>
+                  <a:rPr lang="es-MX" sz="2000" dirty="0"/>
+                  <a:t> describen un PL particular</a:t>
+                </a:r>
+              </a:p>
+              <a:p>
+                <a:pPr marL="285750" indent="-285750">
+                  <a:buFont typeface="Arial" panose="020B0604020202020204" pitchFamily="34" charset="0"/>
+                  <a:buChar char="•"/>
+                </a:pPr>
+                <a:r>
+                  <a:rPr lang="es-MX" sz="2000" dirty="0"/>
+                  <a:t>La forma estándar, </a:t>
+                </a:r>
+                <a14:m>
+                  <m:oMath xmlns:m="http://schemas.openxmlformats.org/officeDocument/2006/math">
+                    <m:sSub>
+                      <m:sSubPr>
+                        <m:ctrlPr>
+                          <a:rPr lang="es-MX" sz="2000" i="1">
+                            <a:latin typeface="Cambria Math" panose="02040503050406030204" pitchFamily="18" charset="0"/>
+                          </a:rPr>
+                        </m:ctrlPr>
+                      </m:sSubPr>
+                      <m:e>
+                        <m:r>
+                          <a:rPr lang="es-PE" sz="2000" i="1">
+                            <a:latin typeface="Cambria Math" panose="02040503050406030204" pitchFamily="18" charset="0"/>
+                          </a:rPr>
+                          <m:t>𝑏</m:t>
+                        </m:r>
+                      </m:e>
+                      <m:sub>
+                        <m:r>
+                          <a:rPr lang="es-PE" sz="2000" i="1">
+                            <a:latin typeface="Cambria Math" panose="02040503050406030204" pitchFamily="18" charset="0"/>
+                          </a:rPr>
+                          <m:t>𝑖</m:t>
+                        </m:r>
+                      </m:sub>
+                    </m:sSub>
+                    <m:r>
+                      <a:rPr lang="es-PE" sz="2000" b="0" i="0" smtClean="0">
+                        <a:latin typeface="Cambria Math" panose="02040503050406030204" pitchFamily="18" charset="0"/>
+                      </a:rPr>
+                      <m:t>≥0</m:t>
+                    </m:r>
+                  </m:oMath>
+                </a14:m>
+                <a:r>
+                  <a:rPr lang="es-MX" sz="2000" dirty="0"/>
+                  <a:t> para </a:t>
+                </a:r>
+                <a14:m>
+                  <m:oMath xmlns:m="http://schemas.openxmlformats.org/officeDocument/2006/math">
+                    <m:r>
+                      <a:rPr lang="es-PE" sz="2000" i="1">
+                        <a:latin typeface="Cambria Math" panose="02040503050406030204" pitchFamily="18" charset="0"/>
+                      </a:rPr>
+                      <m:t>𝑖</m:t>
+                    </m:r>
+                    <m:r>
+                      <a:rPr lang="es-PE" sz="2000" i="1">
+                        <a:latin typeface="Cambria Math" panose="02040503050406030204" pitchFamily="18" charset="0"/>
+                      </a:rPr>
+                      <m:t>=1,2,…,</m:t>
+                    </m:r>
+                    <m:r>
+                      <a:rPr lang="es-PE" sz="2000" i="1">
+                        <a:latin typeface="Cambria Math" panose="02040503050406030204" pitchFamily="18" charset="0"/>
+                      </a:rPr>
+                      <m:t>𝑚</m:t>
+                    </m:r>
+                  </m:oMath>
+                </a14:m>
+                <a:r>
+                  <a:rPr lang="es-MX" sz="2000" dirty="0"/>
+                  <a:t> </a:t>
+                </a:r>
+              </a:p>
+            </p:txBody>
+          </p:sp>
+        </mc:Choice>
+        <mc:Fallback>
+          <p:sp>
+            <p:nvSpPr>
+              <p:cNvPr id="8" name="CuadroTexto 4">
+                <a:extLst>
+                  <a:ext uri="{FF2B5EF4-FFF2-40B4-BE49-F238E27FC236}">
+                    <a16:creationId xmlns:a16="http://schemas.microsoft.com/office/drawing/2014/main" id="{F31C097F-38DA-47AA-BEDF-8AA58B8B2848}"/>
+                  </a:ext>
+                </a:extLst>
+              </p:cNvPr>
+              <p:cNvSpPr txBox="1">
+                <a:spLocks noRot="1" noChangeAspect="1" noMove="1" noResize="1" noEditPoints="1" noAdjustHandles="1" noChangeArrowheads="1" noChangeShapeType="1" noTextEdit="1"/>
+              </p:cNvSpPr>
+              <p:nvPr/>
+            </p:nvSpPr>
+            <p:spPr>
+              <a:xfrm>
+                <a:off x="602191" y="3870417"/>
+                <a:ext cx="8002257" cy="1040349"/>
+              </a:xfrm>
+              <a:prstGeom prst="rect">
+                <a:avLst/>
+              </a:prstGeom>
+              <a:blipFill>
+                <a:blip r:embed="rId3"/>
+                <a:stretch>
+                  <a:fillRect l="-686" t="-1754" b="-10526"/>
+                </a:stretch>
+              </a:blipFill>
+            </p:spPr>
+            <p:txBody>
+              <a:bodyPr/>
+              <a:lstStyle/>
+              <a:p>
+                <a:r>
+                  <a:rPr lang="es-PE">
+                    <a:noFill/>
+                  </a:rPr>
+                  <a:t> </a:t>
+                </a:r>
+              </a:p>
+            </p:txBody>
+          </p:sp>
+        </mc:Fallback>
+      </mc:AlternateContent>
+    </p:spTree>
+    <p:extLst>
+      <p:ext uri="{BB962C8B-B14F-4D97-AF65-F5344CB8AC3E}">
+        <p14:creationId xmlns:p14="http://schemas.microsoft.com/office/powerpoint/2010/main" val="3329245721"/>
+      </p:ext>
+    </p:extLst>
+  </p:cSld>
+  <p:clrMapOvr>
+    <a:masterClrMapping/>
+  </p:clrMapOvr>
+  <p:transition spd="slow">
+    <p:fade/>
+  </p:transition>
+</p:sld>
+</file>
+
+<file path=ppt/slides/slide3.xml><?xml version="1.0" encoding="utf-8"?>
+<p:sld xmlns:a="http://schemas.openxmlformats.org/drawingml/2006/main" xmlns:r="http://schemas.openxmlformats.org/officeDocument/2006/relationships" xmlns:p="http://schemas.openxmlformats.org/presentationml/2006/main">
+  <p:cSld>
+    <p:spTree>
+      <p:nvGrpSpPr>
+        <p:cNvPr id="1" name=""/>
+        <p:cNvGrpSpPr/>
+        <p:nvPr/>
+      </p:nvGrpSpPr>
+      <p:grpSpPr>
+        <a:xfrm>
+          <a:off x="0" y="0"/>
+          <a:ext cx="0" cy="0"/>
+          <a:chOff x="0" y="0"/>
+          <a:chExt cx="0" cy="0"/>
+        </a:xfrm>
+      </p:grpSpPr>
+      <p:sp>
+        <p:nvSpPr>
+          <p:cNvPr id="2" name="Marcador de número de diapositiva 1"/>
+          <p:cNvSpPr>
+            <a:spLocks noGrp="1"/>
+          </p:cNvSpPr>
+          <p:nvPr>
+            <p:ph type="sldNum" sz="quarter" idx="12"/>
+          </p:nvPr>
+        </p:nvSpPr>
+        <p:spPr/>
+        <p:txBody>
+          <a:bodyPr/>
+          <a:lstStyle/>
+          <a:p>
+            <a:fld id="{64BD7E74-CBD2-4D88-9109-2EA8081AE675}" type="slidenum">
+              <a:rPr lang="es-ES" smtClean="0"/>
+              <a:pPr/>
+              <a:t>3</a:t>
+            </a:fld>
+            <a:endParaRPr lang="es-ES"/>
+          </a:p>
+        </p:txBody>
+      </p:sp>
+      <p:sp>
+        <p:nvSpPr>
+          <p:cNvPr id="3" name="4 Título"/>
+          <p:cNvSpPr txBox="1">
+            <a:spLocks/>
+          </p:cNvSpPr>
+          <p:nvPr/>
+        </p:nvSpPr>
+        <p:spPr>
+          <a:xfrm>
+            <a:off x="611560" y="188640"/>
+            <a:ext cx="8784976" cy="457120"/>
+          </a:xfrm>
+          <a:prstGeom prst="rect">
+            <a:avLst/>
+          </a:prstGeom>
+        </p:spPr>
+        <p:txBody>
+          <a:bodyPr bIns="91440" anchor="b" anchorCtr="0">
+            <a:noAutofit/>
+          </a:bodyPr>
+          <a:lstStyle>
+            <a:lvl1pPr>
+              <a:spcBef>
+                <a:spcPct val="0"/>
+              </a:spcBef>
+              <a:buNone/>
+              <a:defRPr kumimoji="0" sz="2400">
+                <a:ln w="0"/>
+                <a:solidFill>
+                  <a:schemeClr val="tx2"/>
+                </a:solidFill>
+                <a:effectLst>
+                  <a:outerShdw blurRad="38100" dist="19050" dir="2700000" algn="tl" rotWithShape="0">
+                    <a:schemeClr val="dk1">
+                      <a:alpha val="40000"/>
+                    </a:schemeClr>
+                  </a:outerShdw>
+                </a:effectLst>
+                <a:latin typeface="+mj-lt"/>
+                <a:ea typeface="+mj-ea"/>
+                <a:cs typeface="+mj-cs"/>
+              </a:defRPr>
+            </a:lvl1pPr>
+          </a:lstStyle>
+          <a:p>
+            <a:r>
+              <a:rPr lang="es-PE" altLang="en-US" dirty="0"/>
+              <a:t>Programación lineal (PL): Métodos de solución</a:t>
+            </a:r>
+          </a:p>
+        </p:txBody>
+      </p:sp>
+      <p:sp>
+        <p:nvSpPr>
+          <p:cNvPr id="10" name="CuadroTexto 4">
+            <a:extLst>
+              <a:ext uri="{FF2B5EF4-FFF2-40B4-BE49-F238E27FC236}">
+                <a16:creationId xmlns:a16="http://schemas.microsoft.com/office/drawing/2014/main" id="{0EE2E59A-EFC5-4F7D-8B1B-CDE02E4D869C}"/>
+              </a:ext>
+            </a:extLst>
+          </p:cNvPr>
+          <p:cNvSpPr txBox="1"/>
+          <p:nvPr/>
+        </p:nvSpPr>
+        <p:spPr>
+          <a:xfrm>
+            <a:off x="602191" y="2780928"/>
+            <a:ext cx="8362297" cy="3416320"/>
+          </a:xfrm>
+          <a:prstGeom prst="rect">
+            <a:avLst/>
+          </a:prstGeom>
+          <a:noFill/>
+        </p:spPr>
+        <p:txBody>
+          <a:bodyPr wrap="square" rtlCol="0">
+            <a:spAutoFit/>
+          </a:bodyPr>
+          <a:lstStyle/>
+          <a:p>
+            <a:pPr marL="285750" indent="-285750">
+              <a:buFont typeface="Arial" panose="020B0604020202020204" pitchFamily="34" charset="0"/>
+              <a:buChar char="•"/>
+            </a:pPr>
+            <a:r>
+              <a:rPr lang="es-MX" b="1" i="1" dirty="0"/>
+              <a:t>Método simplex primal y dual</a:t>
+            </a:r>
+            <a:r>
+              <a:rPr lang="es-MX" dirty="0"/>
+              <a:t> (SX).</a:t>
             </a:r>
           </a:p>
           <a:p>
@@ -5595,8 +5946,8 @@
               <a:buChar char="•"/>
             </a:pPr>
             <a:r>
-              <a:rPr lang="es-MX" sz="2000" dirty="0"/>
-              <a:t>Muchas iteraciones simples, moviéndose de un vértice para otro adyacente de la región factible con mejor función objetivo.</a:t>
+              <a:rPr lang="es-MX" dirty="0"/>
+              <a:t>Muchas iteraciones simples, moviéndose de un vértice a otro adyacente de la región factible con mejor función objetivo.</a:t>
             </a:r>
           </a:p>
           <a:p>
@@ -5605,7 +5956,7 @@
               <a:buChar char="•"/>
             </a:pPr>
             <a:r>
-              <a:rPr lang="es-MX" sz="2000" dirty="0"/>
+              <a:rPr lang="es-MX" dirty="0"/>
               <a:t>Eficiente para problemas de tamaño medio.</a:t>
             </a:r>
           </a:p>
@@ -5615,7 +5966,7 @@
               <a:buChar char="•"/>
             </a:pPr>
             <a:r>
-              <a:rPr lang="es-MX" sz="2000" dirty="0"/>
+              <a:rPr lang="es-MX" dirty="0"/>
               <a:t>El tiempo computacional depende del número de restricciones al cubo.</a:t>
             </a:r>
           </a:p>
@@ -5625,8 +5976,12 @@
               <a:buChar char="•"/>
             </a:pPr>
             <a:r>
-              <a:rPr lang="es-MX" sz="2000" dirty="0"/>
-              <a:t>Método de punto interior (MPI) primal-dual y predictor-corrector</a:t>
+              <a:rPr lang="es-MX" b="1" i="1" dirty="0"/>
+              <a:t>Método de punto interior</a:t>
+            </a:r>
+            <a:r>
+              <a:rPr lang="es-MX" dirty="0"/>
+              <a:t> (PI) primal-dual y predictor-corrector</a:t>
             </a:r>
           </a:p>
           <a:p>
@@ -5635,7 +5990,7 @@
               <a:buChar char="•"/>
             </a:pPr>
             <a:r>
-              <a:rPr lang="es-MX" sz="2000" dirty="0"/>
+              <a:rPr lang="es-MX" dirty="0"/>
               <a:t>Pocas iteraciones computacionalmente costosas por puntos interiores de la región factible</a:t>
             </a:r>
           </a:p>
@@ -5645,7 +6000,7 @@
               <a:buChar char="•"/>
             </a:pPr>
             <a:r>
-              <a:rPr lang="es-MX" sz="2000" dirty="0"/>
+              <a:rPr lang="es-MX" dirty="0"/>
               <a:t>Eficiente para problemas de grande tamaño.</a:t>
             </a:r>
           </a:p>
@@ -5655,7 +6010,7 @@
               <a:buChar char="•"/>
             </a:pPr>
             <a:r>
-              <a:rPr lang="es-MX" sz="2000" dirty="0"/>
+              <a:rPr lang="es-MX" dirty="0"/>
               <a:t>EL tiempo computacional depende casi linealmente del número de elementos no nulos de la matriz de restricciones.</a:t>
             </a:r>
           </a:p>
@@ -5665,14 +6020,18 @@
               <a:buChar char="•"/>
             </a:pPr>
             <a:r>
-              <a:rPr lang="es-MX" sz="2000" dirty="0"/>
-              <a:t>Problema convexo, ambos métodos encuentran una solución óptima o global, no tiene problemas de convergencia.</a:t>
-            </a:r>
-          </a:p>
-        </p:txBody>
-      </p:sp>
-      <mc:AlternateContent xmlns:mc="http://schemas.openxmlformats.org/markup-compatibility/2006" xmlns:a14="http://schemas.microsoft.com/office/drawing/2010/main">
-        <mc:Choice Requires="a14">
+              <a:rPr lang="es-MX" b="1" i="1" dirty="0"/>
+              <a:t>Para un problema convexo: </a:t>
+            </a:r>
+            <a:r>
+              <a:rPr lang="es-MX" dirty="0"/>
+              <a:t>ambos métodos encuentran una solución óptima o global, no tiene problemas de convergencia.</a:t>
+            </a:r>
+          </a:p>
+        </p:txBody>
+      </p:sp>
+      <mc:AlternateContent xmlns:mc="http://schemas.openxmlformats.org/markup-compatibility/2006">
+        <mc:Choice xmlns:a14="http://schemas.microsoft.com/office/drawing/2010/main" Requires="a14">
           <p:sp>
             <p:nvSpPr>
               <p:cNvPr id="6" name="TextBox 5">
@@ -5687,7 +6046,7 @@
             </p:nvSpPr>
             <p:spPr>
               <a:xfrm>
-                <a:off x="2915816" y="404664"/>
+                <a:off x="3307175" y="680112"/>
                 <a:ext cx="2952328" cy="2066463"/>
               </a:xfrm>
               <a:prstGeom prst="rect">
@@ -6080,7 +6439,7 @@
             </p:txBody>
           </p:sp>
         </mc:Choice>
-        <mc:Fallback xmlns="">
+        <mc:Fallback>
           <p:sp>
             <p:nvSpPr>
               <p:cNvPr id="6" name="TextBox 5">
@@ -6097,7 +6456,7 @@
             </p:nvSpPr>
             <p:spPr>
               <a:xfrm>
-                <a:off x="2915816" y="404664"/>
+                <a:off x="3307175" y="680112"/>
                 <a:ext cx="2952328" cy="2066463"/>
               </a:xfrm>
               <a:prstGeom prst="rect">
@@ -6106,7 +6465,7 @@
               <a:blipFill>
                 <a:blip r:embed="rId2"/>
                 <a:stretch>
-                  <a:fillRect l="-3711" b="-1180"/>
+                  <a:fillRect l="-3719" b="-885"/>
                 </a:stretch>
               </a:blipFill>
             </p:spPr>
@@ -6141,7 +6500,7 @@
 </p:sld>
 </file>
 
-<file path=ppt/slides/slide3.xml><?xml version="1.0" encoding="utf-8"?>
+<file path=ppt/slides/slide4.xml><?xml version="1.0" encoding="utf-8"?>
 <p:sld xmlns:a="http://schemas.openxmlformats.org/drawingml/2006/main" xmlns:r="http://schemas.openxmlformats.org/officeDocument/2006/relationships" xmlns:p="http://schemas.openxmlformats.org/presentationml/2006/main">
   <p:cSld>
     <p:spTree>
@@ -6176,7 +6535,7 @@
             <a:fld id="{64BD7E74-CBD2-4D88-9109-2EA8081AE675}" type="slidenum">
               <a:rPr lang="es-ES" smtClean="0"/>
               <a:pPr/>
-              <a:t>3</a:t>
+              <a:t>4</a:t>
             </a:fld>
             <a:endParaRPr lang="es-ES"/>
           </a:p>
@@ -6230,263 +6589,1049 @@
           <a:p>
             <a:r>
               <a:rPr lang="es-PE" altLang="en-US" dirty="0"/>
-              <a:t>Programación lineal</a:t>
-            </a:r>
-          </a:p>
-        </p:txBody>
-      </p:sp>
-      <p:sp>
-        <p:nvSpPr>
-          <p:cNvPr id="10" name="CuadroTexto 4">
-            <a:extLst>
-              <a:ext uri="{FF2B5EF4-FFF2-40B4-BE49-F238E27FC236}">
-                <a16:creationId xmlns:a16="http://schemas.microsoft.com/office/drawing/2014/main" id="{0EE2E59A-EFC5-4F7D-8B1B-CDE02E4D869C}"/>
-              </a:ext>
-            </a:extLst>
-          </p:cNvPr>
-          <p:cNvSpPr txBox="1"/>
-          <p:nvPr/>
-        </p:nvSpPr>
-        <p:spPr>
-          <a:xfrm>
-            <a:off x="602191" y="836712"/>
-            <a:ext cx="8002257" cy="400110"/>
-          </a:xfrm>
-          <a:prstGeom prst="rect">
-            <a:avLst/>
-          </a:prstGeom>
-          <a:noFill/>
-        </p:spPr>
-        <p:txBody>
-          <a:bodyPr wrap="square" rtlCol="0">
-            <a:spAutoFit/>
-          </a:bodyPr>
-          <a:lstStyle/>
-          <a:p>
-            <a:pPr marL="285750" indent="-285750">
-              <a:buFont typeface="Arial" panose="020B0604020202020204" pitchFamily="34" charset="0"/>
-              <a:buChar char="•"/>
-            </a:pPr>
-            <a:r>
-              <a:rPr lang="es-MX" sz="2000" dirty="0"/>
-              <a:t>.</a:t>
+              <a:t>Programación lineal: Forma gráfica</a:t>
             </a:r>
           </a:p>
         </p:txBody>
       </p:sp>
       <p:pic>
         <p:nvPicPr>
-          <p:cNvPr id="4" name="Picture 3">
-            <a:extLst>
-              <a:ext uri="{FF2B5EF4-FFF2-40B4-BE49-F238E27FC236}">
-                <a16:creationId xmlns:a16="http://schemas.microsoft.com/office/drawing/2014/main" id="{56B4E531-A199-47E4-9358-EF7951DA678E}"/>
-              </a:ext>
-            </a:extLst>
-          </p:cNvPr>
+          <p:cNvPr id="5" name="Imagen 4"/>
           <p:cNvPicPr>
             <a:picLocks noChangeAspect="1"/>
           </p:cNvPicPr>
           <p:nvPr/>
         </p:nvPicPr>
         <p:blipFill>
-          <a:blip r:embed="rId2"/>
+          <a:blip r:embed="rId2" cstate="print">
+            <a:extLst>
+              <a:ext uri="{28A0092B-C50C-407E-A947-70E740481C1C}">
+                <a14:useLocalDpi xmlns:a14="http://schemas.microsoft.com/office/drawing/2010/main" val="0"/>
+              </a:ext>
+            </a:extLst>
+          </a:blip>
           <a:stretch>
             <a:fillRect/>
           </a:stretch>
         </p:blipFill>
         <p:spPr>
           <a:xfrm>
-            <a:off x="411195" y="1449478"/>
-            <a:ext cx="8321609" cy="4136087"/>
+            <a:off x="4139952" y="1405147"/>
+            <a:ext cx="4792921" cy="3767707"/>
           </a:xfrm>
           <a:prstGeom prst="rect">
             <a:avLst/>
           </a:prstGeom>
         </p:spPr>
       </p:pic>
+      <mc:AlternateContent xmlns:mc="http://schemas.openxmlformats.org/markup-compatibility/2006">
+        <mc:Choice xmlns:a14="http://schemas.microsoft.com/office/drawing/2010/main" Requires="a14">
+          <p:graphicFrame>
+            <p:nvGraphicFramePr>
+              <p:cNvPr id="8" name="Tabla 7"/>
+              <p:cNvGraphicFramePr>
+                <a:graphicFrameLocks noGrp="1"/>
+              </p:cNvGraphicFramePr>
+              <p:nvPr>
+                <p:extLst>
+                  <p:ext uri="{D42A27DB-BD31-4B8C-83A1-F6EECF244321}">
+                    <p14:modId xmlns:p14="http://schemas.microsoft.com/office/powerpoint/2010/main" val="3751951872"/>
+                  </p:ext>
+                </p:extLst>
+              </p:nvPr>
+            </p:nvGraphicFramePr>
+            <p:xfrm>
+              <a:off x="611560" y="2120473"/>
+              <a:ext cx="3312368" cy="2337054"/>
+            </p:xfrm>
+            <a:graphic>
+              <a:graphicData uri="http://schemas.openxmlformats.org/drawingml/2006/table">
+                <a:tbl>
+                  <a:tblPr firstRow="1" bandRow="1">
+                    <a:tableStyleId>{5940675A-B579-460E-94D1-54222C63F5DA}</a:tableStyleId>
+                  </a:tblPr>
+                  <a:tblGrid>
+                    <a:gridCol w="3312368">
+                      <a:extLst>
+                        <a:ext uri="{9D8B030D-6E8A-4147-A177-3AD203B41FA5}">
+                          <a16:colId xmlns:a16="http://schemas.microsoft.com/office/drawing/2014/main" val="3382599164"/>
+                        </a:ext>
+                      </a:extLst>
+                    </a:gridCol>
+                  </a:tblGrid>
+                  <a:tr h="370840">
+                    <a:tc>
+                      <a:txBody>
+                        <a:bodyPr/>
+                        <a:lstStyle/>
+                        <a:p>
+                          <a14:m>
+                            <m:oMathPara xmlns:m="http://schemas.openxmlformats.org/officeDocument/2006/math">
+                              <m:oMathParaPr>
+                                <m:jc m:val="centerGroup"/>
+                              </m:oMathParaPr>
+                              <m:oMath xmlns:m="http://schemas.openxmlformats.org/officeDocument/2006/math">
+                                <m:func>
+                                  <m:funcPr>
+                                    <m:ctrlPr>
+                                      <a:rPr lang="es-PE" i="1" smtClean="0">
+                                        <a:latin typeface="Cambria Math" panose="02040503050406030204" pitchFamily="18" charset="0"/>
+                                      </a:rPr>
+                                    </m:ctrlPr>
+                                  </m:funcPr>
+                                  <m:fName>
+                                    <m:limLow>
+                                      <m:limLowPr>
+                                        <m:ctrlPr>
+                                          <a:rPr lang="es-PE" i="1" smtClean="0">
+                                            <a:latin typeface="Cambria Math" panose="02040503050406030204" pitchFamily="18" charset="0"/>
+                                          </a:rPr>
+                                        </m:ctrlPr>
+                                      </m:limLowPr>
+                                      <m:e>
+                                        <m:r>
+                                          <m:rPr>
+                                            <m:sty m:val="p"/>
+                                          </m:rPr>
+                                          <a:rPr lang="es-PE" i="0" smtClean="0">
+                                            <a:latin typeface="Cambria Math" panose="02040503050406030204" pitchFamily="18" charset="0"/>
+                                          </a:rPr>
+                                          <m:t>max</m:t>
+                                        </m:r>
+                                      </m:e>
+                                      <m:lim>
+                                        <m:sSub>
+                                          <m:sSubPr>
+                                            <m:ctrlPr>
+                                              <a:rPr lang="es-PE" i="1" smtClean="0">
+                                                <a:latin typeface="Cambria Math" panose="02040503050406030204" pitchFamily="18" charset="0"/>
+                                              </a:rPr>
+                                            </m:ctrlPr>
+                                          </m:sSubPr>
+                                          <m:e>
+                                            <m:r>
+                                              <a:rPr lang="es-PE" b="0" i="1" smtClean="0">
+                                                <a:latin typeface="Cambria Math" panose="02040503050406030204" pitchFamily="18" charset="0"/>
+                                              </a:rPr>
+                                              <m:t>𝑥</m:t>
+                                            </m:r>
+                                          </m:e>
+                                          <m:sub>
+                                            <m:r>
+                                              <a:rPr lang="es-PE" b="0" i="1" smtClean="0">
+                                                <a:latin typeface="Cambria Math" panose="02040503050406030204" pitchFamily="18" charset="0"/>
+                                              </a:rPr>
+                                              <m:t>1</m:t>
+                                            </m:r>
+                                          </m:sub>
+                                        </m:sSub>
+                                        <m:r>
+                                          <a:rPr lang="es-PE" b="0" i="1" smtClean="0">
+                                            <a:latin typeface="Cambria Math" panose="02040503050406030204" pitchFamily="18" charset="0"/>
+                                          </a:rPr>
+                                          <m:t>,</m:t>
+                                        </m:r>
+                                        <m:sSub>
+                                          <m:sSubPr>
+                                            <m:ctrlPr>
+                                              <a:rPr lang="es-PE" b="0" i="1" smtClean="0">
+                                                <a:latin typeface="Cambria Math" panose="02040503050406030204" pitchFamily="18" charset="0"/>
+                                              </a:rPr>
+                                            </m:ctrlPr>
+                                          </m:sSubPr>
+                                          <m:e>
+                                            <m:r>
+                                              <a:rPr lang="es-PE" b="0" i="1" smtClean="0">
+                                                <a:latin typeface="Cambria Math" panose="02040503050406030204" pitchFamily="18" charset="0"/>
+                                              </a:rPr>
+                                              <m:t>𝑥</m:t>
+                                            </m:r>
+                                          </m:e>
+                                          <m:sub>
+                                            <m:r>
+                                              <a:rPr lang="es-PE" b="0" i="1" smtClean="0">
+                                                <a:latin typeface="Cambria Math" panose="02040503050406030204" pitchFamily="18" charset="0"/>
+                                              </a:rPr>
+                                              <m:t>2</m:t>
+                                            </m:r>
+                                          </m:sub>
+                                        </m:sSub>
+                                      </m:lim>
+                                    </m:limLow>
+                                  </m:fName>
+                                  <m:e>
+                                    <m:r>
+                                      <a:rPr lang="es-PE" b="0" i="1" smtClean="0">
+                                        <a:latin typeface="Cambria Math" panose="02040503050406030204" pitchFamily="18" charset="0"/>
+                                      </a:rPr>
+                                      <m:t> </m:t>
+                                    </m:r>
+                                    <m:r>
+                                      <a:rPr lang="es-PE" b="0" i="1" smtClean="0">
+                                        <a:latin typeface="Cambria Math" panose="02040503050406030204" pitchFamily="18" charset="0"/>
+                                      </a:rPr>
+                                      <m:t>𝑧</m:t>
+                                    </m:r>
+                                    <m:r>
+                                      <a:rPr lang="es-PE" b="0" i="1" smtClean="0">
+                                        <a:latin typeface="Cambria Math" panose="02040503050406030204" pitchFamily="18" charset="0"/>
+                                      </a:rPr>
+                                      <m:t>=3</m:t>
+                                    </m:r>
+                                    <m:sSub>
+                                      <m:sSubPr>
+                                        <m:ctrlPr>
+                                          <a:rPr lang="es-PE" b="0" i="1" smtClean="0">
+                                            <a:latin typeface="Cambria Math" panose="02040503050406030204" pitchFamily="18" charset="0"/>
+                                          </a:rPr>
+                                        </m:ctrlPr>
+                                      </m:sSubPr>
+                                      <m:e>
+                                        <m:r>
+                                          <a:rPr lang="es-PE" b="0" i="1" smtClean="0">
+                                            <a:latin typeface="Cambria Math" panose="02040503050406030204" pitchFamily="18" charset="0"/>
+                                          </a:rPr>
+                                          <m:t>𝑥</m:t>
+                                        </m:r>
+                                      </m:e>
+                                      <m:sub>
+                                        <m:r>
+                                          <a:rPr lang="es-PE" b="0" i="1" smtClean="0">
+                                            <a:latin typeface="Cambria Math" panose="02040503050406030204" pitchFamily="18" charset="0"/>
+                                          </a:rPr>
+                                          <m:t>1</m:t>
+                                        </m:r>
+                                      </m:sub>
+                                    </m:sSub>
+                                    <m:r>
+                                      <a:rPr lang="es-PE" b="0" i="1" smtClean="0">
+                                        <a:latin typeface="Cambria Math" panose="02040503050406030204" pitchFamily="18" charset="0"/>
+                                      </a:rPr>
+                                      <m:t>+5</m:t>
+                                    </m:r>
+                                    <m:sSub>
+                                      <m:sSubPr>
+                                        <m:ctrlPr>
+                                          <a:rPr lang="es-PE" b="0" i="1" smtClean="0">
+                                            <a:latin typeface="Cambria Math" panose="02040503050406030204" pitchFamily="18" charset="0"/>
+                                          </a:rPr>
+                                        </m:ctrlPr>
+                                      </m:sSubPr>
+                                      <m:e>
+                                        <m:r>
+                                          <a:rPr lang="es-PE" b="0" i="1" smtClean="0">
+                                            <a:latin typeface="Cambria Math" panose="02040503050406030204" pitchFamily="18" charset="0"/>
+                                          </a:rPr>
+                                          <m:t>𝑥</m:t>
+                                        </m:r>
+                                      </m:e>
+                                      <m:sub>
+                                        <m:r>
+                                          <a:rPr lang="es-PE" b="0" i="1" smtClean="0">
+                                            <a:latin typeface="Cambria Math" panose="02040503050406030204" pitchFamily="18" charset="0"/>
+                                          </a:rPr>
+                                          <m:t>2</m:t>
+                                        </m:r>
+                                      </m:sub>
+                                    </m:sSub>
+                                  </m:e>
+                                </m:func>
+                              </m:oMath>
+                            </m:oMathPara>
+                          </a14:m>
+                          <a:endParaRPr lang="es-PE" dirty="0"/>
+                        </a:p>
+                      </a:txBody>
+                      <a:tcPr>
+                        <a:lnL w="12700" cmpd="sng">
+                          <a:noFill/>
+                        </a:lnL>
+                        <a:lnR w="12700" cmpd="sng">
+                          <a:noFill/>
+                        </a:lnR>
+                        <a:lnT w="12700" cmpd="sng">
+                          <a:noFill/>
+                        </a:lnT>
+                        <a:lnB w="12700" cmpd="sng">
+                          <a:noFill/>
+                        </a:lnB>
+                        <a:lnTlToBr w="12700" cmpd="sng">
+                          <a:noFill/>
+                          <a:prstDash val="solid"/>
+                        </a:lnTlToBr>
+                        <a:lnBlToTr w="12700" cmpd="sng">
+                          <a:noFill/>
+                          <a:prstDash val="solid"/>
+                        </a:lnBlToTr>
+                      </a:tcPr>
+                    </a:tc>
+                    <a:extLst>
+                      <a:ext uri="{0D108BD9-81ED-4DB2-BD59-A6C34878D82A}">
+                        <a16:rowId xmlns:a16="http://schemas.microsoft.com/office/drawing/2014/main" val="4178132430"/>
+                      </a:ext>
+                    </a:extLst>
+                  </a:tr>
+                  <a:tr h="370840">
+                    <a:tc>
+                      <a:txBody>
+                        <a:bodyPr/>
+                        <a:lstStyle/>
+                        <a:p>
+                          <a:r>
+                            <a:rPr lang="es-PE" dirty="0"/>
+                            <a:t>s.t.</a:t>
+                          </a:r>
+                        </a:p>
+                      </a:txBody>
+                      <a:tcPr>
+                        <a:lnL w="12700" cmpd="sng">
+                          <a:noFill/>
+                        </a:lnL>
+                        <a:lnR w="12700" cmpd="sng">
+                          <a:noFill/>
+                        </a:lnR>
+                        <a:lnT w="12700" cmpd="sng">
+                          <a:noFill/>
+                        </a:lnT>
+                        <a:lnB w="12700" cmpd="sng">
+                          <a:noFill/>
+                        </a:lnB>
+                        <a:lnTlToBr w="12700" cmpd="sng">
+                          <a:noFill/>
+                          <a:prstDash val="solid"/>
+                        </a:lnTlToBr>
+                        <a:lnBlToTr w="12700" cmpd="sng">
+                          <a:noFill/>
+                          <a:prstDash val="solid"/>
+                        </a:lnBlToTr>
+                      </a:tcPr>
+                    </a:tc>
+                    <a:extLst>
+                      <a:ext uri="{0D108BD9-81ED-4DB2-BD59-A6C34878D82A}">
+                        <a16:rowId xmlns:a16="http://schemas.microsoft.com/office/drawing/2014/main" val="1654935555"/>
+                      </a:ext>
+                    </a:extLst>
+                  </a:tr>
+                  <a:tr h="370840">
+                    <a:tc>
+                      <a:txBody>
+                        <a:bodyPr/>
+                        <a:lstStyle/>
+                        <a:p>
+                          <a14:m>
+                            <m:oMathPara xmlns:m="http://schemas.openxmlformats.org/officeDocument/2006/math">
+                              <m:oMathParaPr>
+                                <m:jc m:val="centerGroup"/>
+                              </m:oMathParaPr>
+                              <m:oMath xmlns:m="http://schemas.openxmlformats.org/officeDocument/2006/math">
+                                <m:sSub>
+                                  <m:sSubPr>
+                                    <m:ctrlPr>
+                                      <a:rPr lang="es-PE" i="1" smtClean="0">
+                                        <a:latin typeface="Cambria Math" panose="02040503050406030204" pitchFamily="18" charset="0"/>
+                                      </a:rPr>
+                                    </m:ctrlPr>
+                                  </m:sSubPr>
+                                  <m:e>
+                                    <m:r>
+                                      <a:rPr lang="es-PE" b="0" i="1" smtClean="0">
+                                        <a:latin typeface="Cambria Math" panose="02040503050406030204" pitchFamily="18" charset="0"/>
+                                      </a:rPr>
+                                      <m:t>𝑥</m:t>
+                                    </m:r>
+                                  </m:e>
+                                  <m:sub>
+                                    <m:r>
+                                      <a:rPr lang="es-PE" b="0" i="1" smtClean="0">
+                                        <a:latin typeface="Cambria Math" panose="02040503050406030204" pitchFamily="18" charset="0"/>
+                                      </a:rPr>
+                                      <m:t>1</m:t>
+                                    </m:r>
+                                  </m:sub>
+                                </m:sSub>
+                                <m:r>
+                                  <a:rPr lang="es-PE" i="1" smtClean="0">
+                                    <a:latin typeface="Cambria Math" panose="02040503050406030204" pitchFamily="18" charset="0"/>
+                                    <a:ea typeface="Cambria Math" panose="02040503050406030204" pitchFamily="18" charset="0"/>
+                                  </a:rPr>
+                                  <m:t>≤</m:t>
+                                </m:r>
+                                <m:r>
+                                  <a:rPr lang="es-PE" b="0" i="1" smtClean="0">
+                                    <a:latin typeface="Cambria Math" panose="02040503050406030204" pitchFamily="18" charset="0"/>
+                                    <a:ea typeface="Cambria Math" panose="02040503050406030204" pitchFamily="18" charset="0"/>
+                                  </a:rPr>
+                                  <m:t>4</m:t>
+                                </m:r>
+                              </m:oMath>
+                            </m:oMathPara>
+                          </a14:m>
+                          <a:endParaRPr lang="es-PE" dirty="0"/>
+                        </a:p>
+                      </a:txBody>
+                      <a:tcPr>
+                        <a:lnL w="12700" cmpd="sng">
+                          <a:noFill/>
+                        </a:lnL>
+                        <a:lnR w="12700" cmpd="sng">
+                          <a:noFill/>
+                        </a:lnR>
+                        <a:lnT w="12700" cmpd="sng">
+                          <a:noFill/>
+                        </a:lnT>
+                        <a:lnB w="12700" cmpd="sng">
+                          <a:noFill/>
+                        </a:lnB>
+                        <a:lnTlToBr w="12700" cmpd="sng">
+                          <a:noFill/>
+                          <a:prstDash val="solid"/>
+                        </a:lnTlToBr>
+                        <a:lnBlToTr w="12700" cmpd="sng">
+                          <a:noFill/>
+                          <a:prstDash val="solid"/>
+                        </a:lnBlToTr>
+                      </a:tcPr>
+                    </a:tc>
+                    <a:extLst>
+                      <a:ext uri="{0D108BD9-81ED-4DB2-BD59-A6C34878D82A}">
+                        <a16:rowId xmlns:a16="http://schemas.microsoft.com/office/drawing/2014/main" val="3747512519"/>
+                      </a:ext>
+                    </a:extLst>
+                  </a:tr>
+                  <a:tr h="370840">
+                    <a:tc>
+                      <a:txBody>
+                        <a:bodyPr/>
+                        <a:lstStyle/>
+                        <a:p>
+                          <a14:m>
+                            <m:oMathPara xmlns:m="http://schemas.openxmlformats.org/officeDocument/2006/math">
+                              <m:oMathParaPr>
+                                <m:jc m:val="centerGroup"/>
+                              </m:oMathParaPr>
+                              <m:oMath xmlns:m="http://schemas.openxmlformats.org/officeDocument/2006/math">
+                                <m:r>
+                                  <a:rPr lang="es-PE" b="0" i="1" smtClean="0">
+                                    <a:latin typeface="Cambria Math" panose="02040503050406030204" pitchFamily="18" charset="0"/>
+                                  </a:rPr>
+                                  <m:t>2</m:t>
+                                </m:r>
+                                <m:sSub>
+                                  <m:sSubPr>
+                                    <m:ctrlPr>
+                                      <a:rPr lang="es-PE" b="0" i="1" smtClean="0">
+                                        <a:latin typeface="Cambria Math" panose="02040503050406030204" pitchFamily="18" charset="0"/>
+                                      </a:rPr>
+                                    </m:ctrlPr>
+                                  </m:sSubPr>
+                                  <m:e>
+                                    <m:r>
+                                      <a:rPr lang="es-PE" b="0" i="1" smtClean="0">
+                                        <a:latin typeface="Cambria Math" panose="02040503050406030204" pitchFamily="18" charset="0"/>
+                                      </a:rPr>
+                                      <m:t>𝑥</m:t>
+                                    </m:r>
+                                  </m:e>
+                                  <m:sub>
+                                    <m:r>
+                                      <a:rPr lang="es-PE" b="0" i="1" smtClean="0">
+                                        <a:latin typeface="Cambria Math" panose="02040503050406030204" pitchFamily="18" charset="0"/>
+                                      </a:rPr>
+                                      <m:t>2</m:t>
+                                    </m:r>
+                                  </m:sub>
+                                </m:sSub>
+                                <m:r>
+                                  <a:rPr lang="es-PE" b="0" i="1" smtClean="0">
+                                    <a:latin typeface="Cambria Math" panose="02040503050406030204" pitchFamily="18" charset="0"/>
+                                    <a:ea typeface="Cambria Math" panose="02040503050406030204" pitchFamily="18" charset="0"/>
+                                  </a:rPr>
+                                  <m:t>≤12</m:t>
+                                </m:r>
+                              </m:oMath>
+                            </m:oMathPara>
+                          </a14:m>
+                          <a:endParaRPr lang="es-PE" dirty="0"/>
+                        </a:p>
+                      </a:txBody>
+                      <a:tcPr>
+                        <a:lnL w="12700" cmpd="sng">
+                          <a:noFill/>
+                        </a:lnL>
+                        <a:lnR w="12700" cmpd="sng">
+                          <a:noFill/>
+                        </a:lnR>
+                        <a:lnT w="12700" cmpd="sng">
+                          <a:noFill/>
+                        </a:lnT>
+                        <a:lnB w="12700" cmpd="sng">
+                          <a:noFill/>
+                        </a:lnB>
+                        <a:lnTlToBr w="12700" cmpd="sng">
+                          <a:noFill/>
+                          <a:prstDash val="solid"/>
+                        </a:lnTlToBr>
+                        <a:lnBlToTr w="12700" cmpd="sng">
+                          <a:noFill/>
+                          <a:prstDash val="solid"/>
+                        </a:lnBlToTr>
+                      </a:tcPr>
+                    </a:tc>
+                    <a:extLst>
+                      <a:ext uri="{0D108BD9-81ED-4DB2-BD59-A6C34878D82A}">
+                        <a16:rowId xmlns:a16="http://schemas.microsoft.com/office/drawing/2014/main" val="4023038527"/>
+                      </a:ext>
+                    </a:extLst>
+                  </a:tr>
+                  <a:tr h="370840">
+                    <a:tc>
+                      <a:txBody>
+                        <a:bodyPr/>
+                        <a:lstStyle/>
+                        <a:p>
+                          <a14:m>
+                            <m:oMathPara xmlns:m="http://schemas.openxmlformats.org/officeDocument/2006/math">
+                              <m:oMathParaPr>
+                                <m:jc m:val="centerGroup"/>
+                              </m:oMathParaPr>
+                              <m:oMath xmlns:m="http://schemas.openxmlformats.org/officeDocument/2006/math">
+                                <m:r>
+                                  <a:rPr lang="es-PE" b="0" i="1" smtClean="0">
+                                    <a:latin typeface="Cambria Math" panose="02040503050406030204" pitchFamily="18" charset="0"/>
+                                  </a:rPr>
+                                  <m:t>3</m:t>
+                                </m:r>
+                                <m:sSub>
+                                  <m:sSubPr>
+                                    <m:ctrlPr>
+                                      <a:rPr lang="es-PE" b="0" i="1" smtClean="0">
+                                        <a:latin typeface="Cambria Math" panose="02040503050406030204" pitchFamily="18" charset="0"/>
+                                      </a:rPr>
+                                    </m:ctrlPr>
+                                  </m:sSubPr>
+                                  <m:e>
+                                    <m:r>
+                                      <a:rPr lang="es-PE" b="0" i="1" smtClean="0">
+                                        <a:latin typeface="Cambria Math" panose="02040503050406030204" pitchFamily="18" charset="0"/>
+                                      </a:rPr>
+                                      <m:t>𝑥</m:t>
+                                    </m:r>
+                                  </m:e>
+                                  <m:sub>
+                                    <m:r>
+                                      <a:rPr lang="es-PE" b="0" i="1" smtClean="0">
+                                        <a:latin typeface="Cambria Math" panose="02040503050406030204" pitchFamily="18" charset="0"/>
+                                      </a:rPr>
+                                      <m:t>1</m:t>
+                                    </m:r>
+                                  </m:sub>
+                                </m:sSub>
+                                <m:r>
+                                  <a:rPr lang="es-PE" b="0" i="1" smtClean="0">
+                                    <a:latin typeface="Cambria Math" panose="02040503050406030204" pitchFamily="18" charset="0"/>
+                                  </a:rPr>
+                                  <m:t>+2</m:t>
+                                </m:r>
+                                <m:sSub>
+                                  <m:sSubPr>
+                                    <m:ctrlPr>
+                                      <a:rPr lang="es-PE" b="0" i="1" smtClean="0">
+                                        <a:latin typeface="Cambria Math" panose="02040503050406030204" pitchFamily="18" charset="0"/>
+                                      </a:rPr>
+                                    </m:ctrlPr>
+                                  </m:sSubPr>
+                                  <m:e>
+                                    <m:r>
+                                      <a:rPr lang="es-PE" b="0" i="1" smtClean="0">
+                                        <a:latin typeface="Cambria Math" panose="02040503050406030204" pitchFamily="18" charset="0"/>
+                                      </a:rPr>
+                                      <m:t>𝑥</m:t>
+                                    </m:r>
+                                  </m:e>
+                                  <m:sub>
+                                    <m:r>
+                                      <a:rPr lang="es-PE" b="0" i="1" smtClean="0">
+                                        <a:latin typeface="Cambria Math" panose="02040503050406030204" pitchFamily="18" charset="0"/>
+                                      </a:rPr>
+                                      <m:t>2</m:t>
+                                    </m:r>
+                                  </m:sub>
+                                </m:sSub>
+                                <m:r>
+                                  <a:rPr lang="es-PE" b="0" i="1" smtClean="0">
+                                    <a:latin typeface="Cambria Math" panose="02040503050406030204" pitchFamily="18" charset="0"/>
+                                    <a:ea typeface="Cambria Math" panose="02040503050406030204" pitchFamily="18" charset="0"/>
+                                  </a:rPr>
+                                  <m:t>≤18</m:t>
+                                </m:r>
+                              </m:oMath>
+                            </m:oMathPara>
+                          </a14:m>
+                          <a:endParaRPr lang="es-PE" dirty="0"/>
+                        </a:p>
+                      </a:txBody>
+                      <a:tcPr>
+                        <a:lnL w="12700" cmpd="sng">
+                          <a:noFill/>
+                        </a:lnL>
+                        <a:lnR w="12700" cmpd="sng">
+                          <a:noFill/>
+                        </a:lnR>
+                        <a:lnT w="12700" cmpd="sng">
+                          <a:noFill/>
+                        </a:lnT>
+                        <a:lnB w="12700" cmpd="sng">
+                          <a:noFill/>
+                        </a:lnB>
+                        <a:lnTlToBr w="12700" cmpd="sng">
+                          <a:noFill/>
+                          <a:prstDash val="solid"/>
+                        </a:lnTlToBr>
+                        <a:lnBlToTr w="12700" cmpd="sng">
+                          <a:noFill/>
+                          <a:prstDash val="solid"/>
+                        </a:lnBlToTr>
+                      </a:tcPr>
+                    </a:tc>
+                    <a:extLst>
+                      <a:ext uri="{0D108BD9-81ED-4DB2-BD59-A6C34878D82A}">
+                        <a16:rowId xmlns:a16="http://schemas.microsoft.com/office/drawing/2014/main" val="151617654"/>
+                      </a:ext>
+                    </a:extLst>
+                  </a:tr>
+                  <a:tr h="370840">
+                    <a:tc>
+                      <a:txBody>
+                        <a:bodyPr/>
+                        <a:lstStyle/>
+                        <a:p>
+                          <a14:m>
+                            <m:oMathPara xmlns:m="http://schemas.openxmlformats.org/officeDocument/2006/math">
+                              <m:oMathParaPr>
+                                <m:jc m:val="centerGroup"/>
+                              </m:oMathParaPr>
+                              <m:oMath xmlns:m="http://schemas.openxmlformats.org/officeDocument/2006/math">
+                                <m:r>
+                                  <a:rPr lang="es-PE" b="0" i="1" smtClean="0">
+                                    <a:latin typeface="Cambria Math" panose="02040503050406030204" pitchFamily="18" charset="0"/>
+                                  </a:rPr>
+                                  <m:t>0</m:t>
+                                </m:r>
+                                <m:r>
+                                  <a:rPr lang="es-PE" b="0" i="1" smtClean="0">
+                                    <a:latin typeface="Cambria Math" panose="02040503050406030204" pitchFamily="18" charset="0"/>
+                                    <a:ea typeface="Cambria Math" panose="02040503050406030204" pitchFamily="18" charset="0"/>
+                                  </a:rPr>
+                                  <m:t>≤</m:t>
+                                </m:r>
+                                <m:sSub>
+                                  <m:sSubPr>
+                                    <m:ctrlPr>
+                                      <a:rPr lang="es-PE" b="0" i="1" smtClean="0">
+                                        <a:latin typeface="Cambria Math" panose="02040503050406030204" pitchFamily="18" charset="0"/>
+                                        <a:ea typeface="Cambria Math" panose="02040503050406030204" pitchFamily="18" charset="0"/>
+                                      </a:rPr>
+                                    </m:ctrlPr>
+                                  </m:sSubPr>
+                                  <m:e>
+                                    <m:r>
+                                      <a:rPr lang="es-PE" b="0" i="1" smtClean="0">
+                                        <a:latin typeface="Cambria Math" panose="02040503050406030204" pitchFamily="18" charset="0"/>
+                                        <a:ea typeface="Cambria Math" panose="02040503050406030204" pitchFamily="18" charset="0"/>
+                                      </a:rPr>
+                                      <m:t>𝑥</m:t>
+                                    </m:r>
+                                  </m:e>
+                                  <m:sub>
+                                    <m:r>
+                                      <a:rPr lang="es-PE" b="0" i="1" smtClean="0">
+                                        <a:latin typeface="Cambria Math" panose="02040503050406030204" pitchFamily="18" charset="0"/>
+                                        <a:ea typeface="Cambria Math" panose="02040503050406030204" pitchFamily="18" charset="0"/>
+                                      </a:rPr>
+                                      <m:t>1</m:t>
+                                    </m:r>
+                                  </m:sub>
+                                </m:sSub>
+                                <m:r>
+                                  <a:rPr lang="es-PE" b="0" i="1" smtClean="0">
+                                    <a:latin typeface="Cambria Math" panose="02040503050406030204" pitchFamily="18" charset="0"/>
+                                    <a:ea typeface="Cambria Math" panose="02040503050406030204" pitchFamily="18" charset="0"/>
+                                  </a:rPr>
+                                  <m:t>,</m:t>
+                                </m:r>
+                                <m:sSub>
+                                  <m:sSubPr>
+                                    <m:ctrlPr>
+                                      <a:rPr lang="es-PE" b="0" i="1" smtClean="0">
+                                        <a:latin typeface="Cambria Math" panose="02040503050406030204" pitchFamily="18" charset="0"/>
+                                        <a:ea typeface="Cambria Math" panose="02040503050406030204" pitchFamily="18" charset="0"/>
+                                      </a:rPr>
+                                    </m:ctrlPr>
+                                  </m:sSubPr>
+                                  <m:e>
+                                    <m:r>
+                                      <a:rPr lang="es-PE" b="0" i="1" smtClean="0">
+                                        <a:latin typeface="Cambria Math" panose="02040503050406030204" pitchFamily="18" charset="0"/>
+                                        <a:ea typeface="Cambria Math" panose="02040503050406030204" pitchFamily="18" charset="0"/>
+                                      </a:rPr>
+                                      <m:t>𝑥</m:t>
+                                    </m:r>
+                                  </m:e>
+                                  <m:sub>
+                                    <m:r>
+                                      <a:rPr lang="es-PE" b="0" i="1" smtClean="0">
+                                        <a:latin typeface="Cambria Math" panose="02040503050406030204" pitchFamily="18" charset="0"/>
+                                        <a:ea typeface="Cambria Math" panose="02040503050406030204" pitchFamily="18" charset="0"/>
+                                      </a:rPr>
+                                      <m:t>2</m:t>
+                                    </m:r>
+                                  </m:sub>
+                                </m:sSub>
+                              </m:oMath>
+                            </m:oMathPara>
+                          </a14:m>
+                          <a:endParaRPr lang="es-PE" dirty="0"/>
+                        </a:p>
+                      </a:txBody>
+                      <a:tcPr>
+                        <a:lnL w="12700" cmpd="sng">
+                          <a:noFill/>
+                        </a:lnL>
+                        <a:lnR w="12700" cmpd="sng">
+                          <a:noFill/>
+                        </a:lnR>
+                        <a:lnT w="12700" cmpd="sng">
+                          <a:noFill/>
+                        </a:lnT>
+                        <a:lnB w="12700" cmpd="sng">
+                          <a:noFill/>
+                        </a:lnB>
+                        <a:lnTlToBr w="12700" cmpd="sng">
+                          <a:noFill/>
+                          <a:prstDash val="solid"/>
+                        </a:lnTlToBr>
+                        <a:lnBlToTr w="12700" cmpd="sng">
+                          <a:noFill/>
+                          <a:prstDash val="solid"/>
+                        </a:lnBlToTr>
+                      </a:tcPr>
+                    </a:tc>
+                    <a:extLst>
+                      <a:ext uri="{0D108BD9-81ED-4DB2-BD59-A6C34878D82A}">
+                        <a16:rowId xmlns:a16="http://schemas.microsoft.com/office/drawing/2014/main" val="914160747"/>
+                      </a:ext>
+                    </a:extLst>
+                  </a:tr>
+                </a:tbl>
+              </a:graphicData>
+            </a:graphic>
+          </p:graphicFrame>
+        </mc:Choice>
+        <mc:Fallback>
+          <p:graphicFrame>
+            <p:nvGraphicFramePr>
+              <p:cNvPr id="8" name="Tabla 7"/>
+              <p:cNvGraphicFramePr>
+                <a:graphicFrameLocks noGrp="1"/>
+              </p:cNvGraphicFramePr>
+              <p:nvPr>
+                <p:extLst>
+                  <p:ext uri="{D42A27DB-BD31-4B8C-83A1-F6EECF244321}">
+                    <p14:modId xmlns:p14="http://schemas.microsoft.com/office/powerpoint/2010/main" val="3751951872"/>
+                  </p:ext>
+                </p:extLst>
+              </p:nvPr>
+            </p:nvGraphicFramePr>
+            <p:xfrm>
+              <a:off x="611560" y="2120473"/>
+              <a:ext cx="3312368" cy="2337054"/>
+            </p:xfrm>
+            <a:graphic>
+              <a:graphicData uri="http://schemas.openxmlformats.org/drawingml/2006/table">
+                <a:tbl>
+                  <a:tblPr firstRow="1" bandRow="1">
+                    <a:tableStyleId>{5940675A-B579-460E-94D1-54222C63F5DA}</a:tableStyleId>
+                  </a:tblPr>
+                  <a:tblGrid>
+                    <a:gridCol w="3312368">
+                      <a:extLst>
+                        <a:ext uri="{9D8B030D-6E8A-4147-A177-3AD203B41FA5}">
+                          <a16:colId xmlns:a16="http://schemas.microsoft.com/office/drawing/2014/main" val="3382599164"/>
+                        </a:ext>
+                      </a:extLst>
+                    </a:gridCol>
+                  </a:tblGrid>
+                  <a:tr h="482854">
+                    <a:tc>
+                      <a:txBody>
+                        <a:bodyPr/>
+                        <a:lstStyle/>
+                        <a:p>
+                          <a:endParaRPr lang="es-PE"/>
+                        </a:p>
+                      </a:txBody>
+                      <a:tcPr>
+                        <a:lnL w="12700" cmpd="sng">
+                          <a:noFill/>
+                        </a:lnL>
+                        <a:lnR w="12700" cmpd="sng">
+                          <a:noFill/>
+                        </a:lnR>
+                        <a:lnT w="12700" cmpd="sng">
+                          <a:noFill/>
+                        </a:lnT>
+                        <a:lnB w="12700" cmpd="sng">
+                          <a:noFill/>
+                        </a:lnB>
+                        <a:lnTlToBr w="12700" cmpd="sng">
+                          <a:noFill/>
+                          <a:prstDash val="solid"/>
+                        </a:lnTlToBr>
+                        <a:lnBlToTr w="12700" cmpd="sng">
+                          <a:noFill/>
+                          <a:prstDash val="solid"/>
+                        </a:lnBlToTr>
+                        <a:blipFill>
+                          <a:blip r:embed="rId3"/>
+                          <a:stretch>
+                            <a:fillRect b="-381250"/>
+                          </a:stretch>
+                        </a:blipFill>
+                      </a:tcPr>
+                    </a:tc>
+                    <a:extLst>
+                      <a:ext uri="{0D108BD9-81ED-4DB2-BD59-A6C34878D82A}">
+                        <a16:rowId xmlns:a16="http://schemas.microsoft.com/office/drawing/2014/main" val="4178132430"/>
+                      </a:ext>
+                    </a:extLst>
+                  </a:tr>
+                  <a:tr h="370840">
+                    <a:tc>
+                      <a:txBody>
+                        <a:bodyPr/>
+                        <a:lstStyle/>
+                        <a:p>
+                          <a:r>
+                            <a:rPr lang="es-PE" dirty="0"/>
+                            <a:t>s.t.</a:t>
+                          </a:r>
+                        </a:p>
+                      </a:txBody>
+                      <a:tcPr>
+                        <a:lnL w="12700" cmpd="sng">
+                          <a:noFill/>
+                        </a:lnL>
+                        <a:lnR w="12700" cmpd="sng">
+                          <a:noFill/>
+                        </a:lnR>
+                        <a:lnT w="12700" cmpd="sng">
+                          <a:noFill/>
+                        </a:lnT>
+                        <a:lnB w="12700" cmpd="sng">
+                          <a:noFill/>
+                        </a:lnB>
+                        <a:lnTlToBr w="12700" cmpd="sng">
+                          <a:noFill/>
+                          <a:prstDash val="solid"/>
+                        </a:lnTlToBr>
+                        <a:lnBlToTr w="12700" cmpd="sng">
+                          <a:noFill/>
+                          <a:prstDash val="solid"/>
+                        </a:lnBlToTr>
+                      </a:tcPr>
+                    </a:tc>
+                    <a:extLst>
+                      <a:ext uri="{0D108BD9-81ED-4DB2-BD59-A6C34878D82A}">
+                        <a16:rowId xmlns:a16="http://schemas.microsoft.com/office/drawing/2014/main" val="1654935555"/>
+                      </a:ext>
+                    </a:extLst>
+                  </a:tr>
+                  <a:tr h="370840">
+                    <a:tc>
+                      <a:txBody>
+                        <a:bodyPr/>
+                        <a:lstStyle/>
+                        <a:p>
+                          <a:endParaRPr lang="es-PE"/>
+                        </a:p>
+                      </a:txBody>
+                      <a:tcPr>
+                        <a:lnL w="12700" cmpd="sng">
+                          <a:noFill/>
+                        </a:lnL>
+                        <a:lnR w="12700" cmpd="sng">
+                          <a:noFill/>
+                        </a:lnR>
+                        <a:lnT w="12700" cmpd="sng">
+                          <a:noFill/>
+                        </a:lnT>
+                        <a:lnB w="12700" cmpd="sng">
+                          <a:noFill/>
+                        </a:lnB>
+                        <a:lnTlToBr w="12700" cmpd="sng">
+                          <a:noFill/>
+                          <a:prstDash val="solid"/>
+                        </a:lnTlToBr>
+                        <a:lnBlToTr w="12700" cmpd="sng">
+                          <a:noFill/>
+                          <a:prstDash val="solid"/>
+                        </a:lnBlToTr>
+                        <a:blipFill>
+                          <a:blip r:embed="rId3"/>
+                          <a:stretch>
+                            <a:fillRect t="-231148" b="-300000"/>
+                          </a:stretch>
+                        </a:blipFill>
+                      </a:tcPr>
+                    </a:tc>
+                    <a:extLst>
+                      <a:ext uri="{0D108BD9-81ED-4DB2-BD59-A6C34878D82A}">
+                        <a16:rowId xmlns:a16="http://schemas.microsoft.com/office/drawing/2014/main" val="3747512519"/>
+                      </a:ext>
+                    </a:extLst>
+                  </a:tr>
+                  <a:tr h="370840">
+                    <a:tc>
+                      <a:txBody>
+                        <a:bodyPr/>
+                        <a:lstStyle/>
+                        <a:p>
+                          <a:endParaRPr lang="es-PE"/>
+                        </a:p>
+                      </a:txBody>
+                      <a:tcPr>
+                        <a:lnL w="12700" cmpd="sng">
+                          <a:noFill/>
+                        </a:lnL>
+                        <a:lnR w="12700" cmpd="sng">
+                          <a:noFill/>
+                        </a:lnR>
+                        <a:lnT w="12700" cmpd="sng">
+                          <a:noFill/>
+                        </a:lnT>
+                        <a:lnB w="12700" cmpd="sng">
+                          <a:noFill/>
+                        </a:lnB>
+                        <a:lnTlToBr w="12700" cmpd="sng">
+                          <a:noFill/>
+                          <a:prstDash val="solid"/>
+                        </a:lnTlToBr>
+                        <a:lnBlToTr w="12700" cmpd="sng">
+                          <a:noFill/>
+                          <a:prstDash val="solid"/>
+                        </a:lnBlToTr>
+                        <a:blipFill>
+                          <a:blip r:embed="rId3"/>
+                          <a:stretch>
+                            <a:fillRect t="-331148" b="-200000"/>
+                          </a:stretch>
+                        </a:blipFill>
+                      </a:tcPr>
+                    </a:tc>
+                    <a:extLst>
+                      <a:ext uri="{0D108BD9-81ED-4DB2-BD59-A6C34878D82A}">
+                        <a16:rowId xmlns:a16="http://schemas.microsoft.com/office/drawing/2014/main" val="4023038527"/>
+                      </a:ext>
+                    </a:extLst>
+                  </a:tr>
+                  <a:tr h="370840">
+                    <a:tc>
+                      <a:txBody>
+                        <a:bodyPr/>
+                        <a:lstStyle/>
+                        <a:p>
+                          <a:endParaRPr lang="es-PE"/>
+                        </a:p>
+                      </a:txBody>
+                      <a:tcPr>
+                        <a:lnL w="12700" cmpd="sng">
+                          <a:noFill/>
+                        </a:lnL>
+                        <a:lnR w="12700" cmpd="sng">
+                          <a:noFill/>
+                        </a:lnR>
+                        <a:lnT w="12700" cmpd="sng">
+                          <a:noFill/>
+                        </a:lnT>
+                        <a:lnB w="12700" cmpd="sng">
+                          <a:noFill/>
+                        </a:lnB>
+                        <a:lnTlToBr w="12700" cmpd="sng">
+                          <a:noFill/>
+                          <a:prstDash val="solid"/>
+                        </a:lnTlToBr>
+                        <a:lnBlToTr w="12700" cmpd="sng">
+                          <a:noFill/>
+                          <a:prstDash val="solid"/>
+                        </a:lnBlToTr>
+                        <a:blipFill>
+                          <a:blip r:embed="rId3"/>
+                          <a:stretch>
+                            <a:fillRect t="-431148" b="-100000"/>
+                          </a:stretch>
+                        </a:blipFill>
+                      </a:tcPr>
+                    </a:tc>
+                    <a:extLst>
+                      <a:ext uri="{0D108BD9-81ED-4DB2-BD59-A6C34878D82A}">
+                        <a16:rowId xmlns:a16="http://schemas.microsoft.com/office/drawing/2014/main" val="151617654"/>
+                      </a:ext>
+                    </a:extLst>
+                  </a:tr>
+                  <a:tr h="370840">
+                    <a:tc>
+                      <a:txBody>
+                        <a:bodyPr/>
+                        <a:lstStyle/>
+                        <a:p>
+                          <a:endParaRPr lang="es-PE"/>
+                        </a:p>
+                      </a:txBody>
+                      <a:tcPr>
+                        <a:lnL w="12700" cmpd="sng">
+                          <a:noFill/>
+                        </a:lnL>
+                        <a:lnR w="12700" cmpd="sng">
+                          <a:noFill/>
+                        </a:lnR>
+                        <a:lnT w="12700" cmpd="sng">
+                          <a:noFill/>
+                        </a:lnT>
+                        <a:lnB w="12700" cmpd="sng">
+                          <a:noFill/>
+                        </a:lnB>
+                        <a:lnTlToBr w="12700" cmpd="sng">
+                          <a:noFill/>
+                          <a:prstDash val="solid"/>
+                        </a:lnTlToBr>
+                        <a:lnBlToTr w="12700" cmpd="sng">
+                          <a:noFill/>
+                          <a:prstDash val="solid"/>
+                        </a:lnBlToTr>
+                        <a:blipFill>
+                          <a:blip r:embed="rId3"/>
+                          <a:stretch>
+                            <a:fillRect t="-531148"/>
+                          </a:stretch>
+                        </a:blipFill>
+                      </a:tcPr>
+                    </a:tc>
+                    <a:extLst>
+                      <a:ext uri="{0D108BD9-81ED-4DB2-BD59-A6C34878D82A}">
+                        <a16:rowId xmlns:a16="http://schemas.microsoft.com/office/drawing/2014/main" val="914160747"/>
+                      </a:ext>
+                    </a:extLst>
+                  </a:tr>
+                </a:tbl>
+              </a:graphicData>
+            </a:graphic>
+          </p:graphicFrame>
+        </mc:Fallback>
+      </mc:AlternateContent>
     </p:spTree>
     <p:extLst>
       <p:ext uri="{BB962C8B-B14F-4D97-AF65-F5344CB8AC3E}">
         <p14:creationId xmlns:p14="http://schemas.microsoft.com/office/powerpoint/2010/main" val="314545884"/>
-      </p:ext>
-    </p:extLst>
-  </p:cSld>
-  <p:clrMapOvr>
-    <a:masterClrMapping/>
-  </p:clrMapOvr>
-  <p:transition spd="slow">
-    <p:fade/>
-  </p:transition>
-</p:sld>
-</file>
-
-<file path=ppt/slides/slide4.xml><?xml version="1.0" encoding="utf-8"?>
-<p:sld xmlns:a="http://schemas.openxmlformats.org/drawingml/2006/main" xmlns:r="http://schemas.openxmlformats.org/officeDocument/2006/relationships" xmlns:p="http://schemas.openxmlformats.org/presentationml/2006/main">
-  <p:cSld>
-    <p:spTree>
-      <p:nvGrpSpPr>
-        <p:cNvPr id="1" name=""/>
-        <p:cNvGrpSpPr/>
-        <p:nvPr/>
-      </p:nvGrpSpPr>
-      <p:grpSpPr>
-        <a:xfrm>
-          <a:off x="0" y="0"/>
-          <a:ext cx="0" cy="0"/>
-          <a:chOff x="0" y="0"/>
-          <a:chExt cx="0" cy="0"/>
-        </a:xfrm>
-      </p:grpSpPr>
-      <p:sp>
-        <p:nvSpPr>
-          <p:cNvPr id="2" name="Marcador de número de diapositiva 1"/>
-          <p:cNvSpPr>
-            <a:spLocks noGrp="1"/>
-          </p:cNvSpPr>
-          <p:nvPr>
-            <p:ph type="sldNum" sz="quarter" idx="12"/>
-          </p:nvPr>
-        </p:nvSpPr>
-        <p:spPr/>
-        <p:txBody>
-          <a:bodyPr/>
-          <a:lstStyle/>
-          <a:p>
-            <a:fld id="{64BD7E74-CBD2-4D88-9109-2EA8081AE675}" type="slidenum">
-              <a:rPr lang="es-ES" smtClean="0"/>
-              <a:pPr/>
-              <a:t>4</a:t>
-            </a:fld>
-            <a:endParaRPr lang="es-ES"/>
-          </a:p>
-        </p:txBody>
-      </p:sp>
-      <p:sp>
-        <p:nvSpPr>
-          <p:cNvPr id="3" name="4 Título"/>
-          <p:cNvSpPr txBox="1">
-            <a:spLocks/>
-          </p:cNvSpPr>
-          <p:nvPr/>
-        </p:nvSpPr>
-        <p:spPr>
-          <a:xfrm>
-            <a:off x="611560" y="188640"/>
-            <a:ext cx="8784976" cy="457120"/>
-          </a:xfrm>
-          <a:prstGeom prst="rect">
-            <a:avLst/>
-          </a:prstGeom>
-        </p:spPr>
-        <p:txBody>
-          <a:bodyPr bIns="91440" anchor="b" anchorCtr="0">
-            <a:noAutofit/>
-          </a:bodyPr>
-          <a:lstStyle>
-            <a:lvl1pPr>
-              <a:spcBef>
-                <a:spcPct val="0"/>
-              </a:spcBef>
-              <a:buNone/>
-              <a:defRPr kumimoji="0" sz="2400">
-                <a:ln w="0"/>
-                <a:solidFill>
-                  <a:schemeClr val="tx2"/>
-                </a:solidFill>
-                <a:effectLst>
-                  <a:outerShdw blurRad="38100" dist="19050" dir="2700000" algn="tl" rotWithShape="0">
-                    <a:schemeClr val="dk1">
-                      <a:alpha val="40000"/>
-                    </a:schemeClr>
-                  </a:outerShdw>
-                </a:effectLst>
-                <a:latin typeface="+mj-lt"/>
-                <a:ea typeface="+mj-ea"/>
-                <a:cs typeface="+mj-cs"/>
-              </a:defRPr>
-            </a:lvl1pPr>
-          </a:lstStyle>
-          <a:p>
-            <a:r>
-              <a:rPr lang="es-PE" altLang="en-US" dirty="0"/>
-              <a:t>Programación lineal</a:t>
-            </a:r>
-          </a:p>
-        </p:txBody>
-      </p:sp>
-      <p:sp>
-        <p:nvSpPr>
-          <p:cNvPr id="10" name="CuadroTexto 4">
-            <a:extLst>
-              <a:ext uri="{FF2B5EF4-FFF2-40B4-BE49-F238E27FC236}">
-                <a16:creationId xmlns:a16="http://schemas.microsoft.com/office/drawing/2014/main" id="{0EE2E59A-EFC5-4F7D-8B1B-CDE02E4D869C}"/>
-              </a:ext>
-            </a:extLst>
-          </p:cNvPr>
-          <p:cNvSpPr txBox="1"/>
-          <p:nvPr/>
-        </p:nvSpPr>
-        <p:spPr>
-          <a:xfrm>
-            <a:off x="602191" y="836712"/>
-            <a:ext cx="8002257" cy="400110"/>
-          </a:xfrm>
-          <a:prstGeom prst="rect">
-            <a:avLst/>
-          </a:prstGeom>
-          <a:noFill/>
-        </p:spPr>
-        <p:txBody>
-          <a:bodyPr wrap="square" rtlCol="0">
-            <a:spAutoFit/>
-          </a:bodyPr>
-          <a:lstStyle/>
-          <a:p>
-            <a:pPr marL="285750" indent="-285750">
-              <a:buFont typeface="Arial" panose="020B0604020202020204" pitchFamily="34" charset="0"/>
-              <a:buChar char="•"/>
-            </a:pPr>
-            <a:r>
-              <a:rPr lang="es-MX" sz="2000" dirty="0"/>
-              <a:t>.</a:t>
-            </a:r>
-          </a:p>
-        </p:txBody>
-      </p:sp>
-      <p:pic>
-        <p:nvPicPr>
-          <p:cNvPr id="5" name="Picture 4">
-            <a:extLst>
-              <a:ext uri="{FF2B5EF4-FFF2-40B4-BE49-F238E27FC236}">
-                <a16:creationId xmlns:a16="http://schemas.microsoft.com/office/drawing/2014/main" id="{9BE4435C-BEFB-4C24-BCA0-F086869B87AA}"/>
-              </a:ext>
-            </a:extLst>
-          </p:cNvPr>
-          <p:cNvPicPr>
-            <a:picLocks noChangeAspect="1"/>
-          </p:cNvPicPr>
-          <p:nvPr/>
-        </p:nvPicPr>
-        <p:blipFill>
-          <a:blip r:embed="rId2"/>
-          <a:stretch>
-            <a:fillRect/>
-          </a:stretch>
-        </p:blipFill>
-        <p:spPr>
-          <a:xfrm>
-            <a:off x="431032" y="1427774"/>
-            <a:ext cx="8461448" cy="4117961"/>
-          </a:xfrm>
-          <a:prstGeom prst="rect">
-            <a:avLst/>
-          </a:prstGeom>
-        </p:spPr>
-      </p:pic>
-    </p:spTree>
-    <p:extLst>
-      <p:ext uri="{BB962C8B-B14F-4D97-AF65-F5344CB8AC3E}">
-        <p14:creationId xmlns:p14="http://schemas.microsoft.com/office/powerpoint/2010/main" val="4271202624"/>
       </p:ext>
     </p:extLst>
   </p:cSld>
@@ -6518,996 +7663,6 @@
       </p:grpSpPr>
       <p:sp>
         <p:nvSpPr>
-          <p:cNvPr id="2" name="Marcador de número de diapositiva 1"/>
-          <p:cNvSpPr>
-            <a:spLocks noGrp="1"/>
-          </p:cNvSpPr>
-          <p:nvPr>
-            <p:ph type="sldNum" sz="quarter" idx="12"/>
-          </p:nvPr>
-        </p:nvSpPr>
-        <p:spPr/>
-        <p:txBody>
-          <a:bodyPr/>
-          <a:lstStyle/>
-          <a:p>
-            <a:fld id="{64BD7E74-CBD2-4D88-9109-2EA8081AE675}" type="slidenum">
-              <a:rPr lang="es-ES" smtClean="0"/>
-              <a:pPr/>
-              <a:t>5</a:t>
-            </a:fld>
-            <a:endParaRPr lang="es-ES"/>
-          </a:p>
-        </p:txBody>
-      </p:sp>
-      <p:sp>
-        <p:nvSpPr>
-          <p:cNvPr id="3" name="4 Título"/>
-          <p:cNvSpPr txBox="1">
-            <a:spLocks/>
-          </p:cNvSpPr>
-          <p:nvPr/>
-        </p:nvSpPr>
-        <p:spPr>
-          <a:xfrm>
-            <a:off x="611560" y="188640"/>
-            <a:ext cx="8784976" cy="457120"/>
-          </a:xfrm>
-          <a:prstGeom prst="rect">
-            <a:avLst/>
-          </a:prstGeom>
-        </p:spPr>
-        <p:txBody>
-          <a:bodyPr bIns="91440" anchor="b" anchorCtr="0">
-            <a:noAutofit/>
-          </a:bodyPr>
-          <a:lstStyle>
-            <a:lvl1pPr>
-              <a:spcBef>
-                <a:spcPct val="0"/>
-              </a:spcBef>
-              <a:buNone/>
-              <a:defRPr kumimoji="0" sz="2400">
-                <a:ln w="0"/>
-                <a:solidFill>
-                  <a:schemeClr val="tx2"/>
-                </a:solidFill>
-                <a:effectLst>
-                  <a:outerShdw blurRad="38100" dist="19050" dir="2700000" algn="tl" rotWithShape="0">
-                    <a:schemeClr val="dk1">
-                      <a:alpha val="40000"/>
-                    </a:schemeClr>
-                  </a:outerShdw>
-                </a:effectLst>
-                <a:latin typeface="+mj-lt"/>
-                <a:ea typeface="+mj-ea"/>
-                <a:cs typeface="+mj-cs"/>
-              </a:defRPr>
-            </a:lvl1pPr>
-          </a:lstStyle>
-          <a:p>
-            <a:r>
-              <a:rPr lang="es-PE" altLang="en-US" dirty="0"/>
-              <a:t>Programación lineal</a:t>
-            </a:r>
-          </a:p>
-        </p:txBody>
-      </p:sp>
-      <p:sp>
-        <p:nvSpPr>
-          <p:cNvPr id="10" name="CuadroTexto 4">
-            <a:extLst>
-              <a:ext uri="{FF2B5EF4-FFF2-40B4-BE49-F238E27FC236}">
-                <a16:creationId xmlns:a16="http://schemas.microsoft.com/office/drawing/2014/main" id="{0EE2E59A-EFC5-4F7D-8B1B-CDE02E4D869C}"/>
-              </a:ext>
-            </a:extLst>
-          </p:cNvPr>
-          <p:cNvSpPr txBox="1"/>
-          <p:nvPr/>
-        </p:nvSpPr>
-        <p:spPr>
-          <a:xfrm>
-            <a:off x="602191" y="836712"/>
-            <a:ext cx="8002257" cy="400110"/>
-          </a:xfrm>
-          <a:prstGeom prst="rect">
-            <a:avLst/>
-          </a:prstGeom>
-          <a:noFill/>
-        </p:spPr>
-        <p:txBody>
-          <a:bodyPr wrap="square" rtlCol="0">
-            <a:spAutoFit/>
-          </a:bodyPr>
-          <a:lstStyle/>
-          <a:p>
-            <a:pPr marL="285750" indent="-285750">
-              <a:buFont typeface="Arial" panose="020B0604020202020204" pitchFamily="34" charset="0"/>
-              <a:buChar char="•"/>
-            </a:pPr>
-            <a:r>
-              <a:rPr lang="es-MX" sz="2000" dirty="0"/>
-              <a:t>Cualquier PL puede ser colocado en una forma estándar</a:t>
-            </a:r>
-          </a:p>
-        </p:txBody>
-      </p:sp>
-      <p:pic>
-        <p:nvPicPr>
-          <p:cNvPr id="4" name="Picture 3">
-            <a:extLst>
-              <a:ext uri="{FF2B5EF4-FFF2-40B4-BE49-F238E27FC236}">
-                <a16:creationId xmlns:a16="http://schemas.microsoft.com/office/drawing/2014/main" id="{641CC9DB-45FA-4FCD-8114-BE417D42F78A}"/>
-              </a:ext>
-            </a:extLst>
-          </p:cNvPr>
-          <p:cNvPicPr>
-            <a:picLocks noChangeAspect="1"/>
-          </p:cNvPicPr>
-          <p:nvPr/>
-        </p:nvPicPr>
-        <p:blipFill>
-          <a:blip r:embed="rId2"/>
-          <a:stretch>
-            <a:fillRect/>
-          </a:stretch>
-        </p:blipFill>
-        <p:spPr>
-          <a:xfrm>
-            <a:off x="1331205" y="1228066"/>
-            <a:ext cx="6544228" cy="2451052"/>
-          </a:xfrm>
-          <a:prstGeom prst="rect">
-            <a:avLst/>
-          </a:prstGeom>
-        </p:spPr>
-      </p:pic>
-      <mc:AlternateContent xmlns:mc="http://schemas.openxmlformats.org/markup-compatibility/2006" xmlns:a14="http://schemas.microsoft.com/office/drawing/2010/main">
-        <mc:Choice Requires="a14">
-          <p:sp>
-            <p:nvSpPr>
-              <p:cNvPr id="8" name="CuadroTexto 4">
-                <a:extLst>
-                  <a:ext uri="{FF2B5EF4-FFF2-40B4-BE49-F238E27FC236}">
-                    <a16:creationId xmlns:a16="http://schemas.microsoft.com/office/drawing/2014/main" id="{F31C097F-38DA-47AA-BEDF-8AA58B8B2848}"/>
-                  </a:ext>
-                </a:extLst>
-              </p:cNvPr>
-              <p:cNvSpPr txBox="1"/>
-              <p:nvPr/>
-            </p:nvSpPr>
-            <p:spPr>
-              <a:xfrm>
-                <a:off x="602191" y="3870417"/>
-                <a:ext cx="8002257" cy="1040349"/>
-              </a:xfrm>
-              <a:prstGeom prst="rect">
-                <a:avLst/>
-              </a:prstGeom>
-              <a:noFill/>
-            </p:spPr>
-            <p:txBody>
-              <a:bodyPr wrap="square" rtlCol="0">
-                <a:spAutoFit/>
-              </a:bodyPr>
-              <a:lstStyle/>
-              <a:p>
-                <a:pPr marL="285750" indent="-285750">
-                  <a:buFont typeface="Arial" panose="020B0604020202020204" pitchFamily="34" charset="0"/>
-                  <a:buChar char="•"/>
-                </a:pPr>
-                <a:r>
-                  <a:rPr lang="es-MX" sz="2000" dirty="0"/>
-                  <a:t>Las constantes </a:t>
-                </a:r>
-                <a14:m>
-                  <m:oMath xmlns:m="http://schemas.openxmlformats.org/officeDocument/2006/math">
-                    <m:sSub>
-                      <m:sSubPr>
-                        <m:ctrlPr>
-                          <a:rPr lang="es-MX" sz="2000" i="1" smtClean="0">
-                            <a:latin typeface="Cambria Math" panose="02040503050406030204" pitchFamily="18" charset="0"/>
-                          </a:rPr>
-                        </m:ctrlPr>
-                      </m:sSubPr>
-                      <m:e>
-                        <m:r>
-                          <a:rPr lang="es-PE" sz="2000" b="0" i="1" smtClean="0">
-                            <a:latin typeface="Cambria Math" panose="02040503050406030204" pitchFamily="18" charset="0"/>
-                          </a:rPr>
-                          <m:t>𝑐</m:t>
-                        </m:r>
-                      </m:e>
-                      <m:sub>
-                        <m:r>
-                          <a:rPr lang="es-PE" sz="2000" b="0" i="1" smtClean="0">
-                            <a:latin typeface="Cambria Math" panose="02040503050406030204" pitchFamily="18" charset="0"/>
-                          </a:rPr>
-                          <m:t>𝑗</m:t>
-                        </m:r>
-                      </m:sub>
-                    </m:sSub>
-                    <m:r>
-                      <a:rPr lang="es-PE" sz="2000" b="0" i="1" smtClean="0">
-                        <a:latin typeface="Cambria Math" panose="02040503050406030204" pitchFamily="18" charset="0"/>
-                      </a:rPr>
-                      <m:t>,</m:t>
-                    </m:r>
-                    <m:sSub>
-                      <m:sSubPr>
-                        <m:ctrlPr>
-                          <a:rPr lang="es-MX" sz="2000" i="1">
-                            <a:latin typeface="Cambria Math" panose="02040503050406030204" pitchFamily="18" charset="0"/>
-                          </a:rPr>
-                        </m:ctrlPr>
-                      </m:sSubPr>
-                      <m:e>
-                        <m:r>
-                          <a:rPr lang="es-PE" sz="2000" b="0" i="1" smtClean="0">
-                            <a:latin typeface="Cambria Math" panose="02040503050406030204" pitchFamily="18" charset="0"/>
-                          </a:rPr>
-                          <m:t>𝑏</m:t>
-                        </m:r>
-                      </m:e>
-                      <m:sub>
-                        <m:r>
-                          <a:rPr lang="es-PE" sz="2000" b="0" i="1" smtClean="0">
-                            <a:latin typeface="Cambria Math" panose="02040503050406030204" pitchFamily="18" charset="0"/>
-                          </a:rPr>
-                          <m:t>𝑖</m:t>
-                        </m:r>
-                      </m:sub>
-                    </m:sSub>
-                  </m:oMath>
-                </a14:m>
-                <a:r>
-                  <a:rPr lang="es-MX" sz="2000" dirty="0"/>
-                  <a:t> y </a:t>
-                </a:r>
-                <a14:m>
-                  <m:oMath xmlns:m="http://schemas.openxmlformats.org/officeDocument/2006/math">
-                    <m:sSub>
-                      <m:sSubPr>
-                        <m:ctrlPr>
-                          <a:rPr lang="es-MX" sz="2000" i="1" smtClean="0">
-                            <a:latin typeface="Cambria Math" panose="02040503050406030204" pitchFamily="18" charset="0"/>
-                          </a:rPr>
-                        </m:ctrlPr>
-                      </m:sSubPr>
-                      <m:e>
-                        <m:r>
-                          <a:rPr lang="es-PE" sz="2000" b="0" i="1" smtClean="0">
-                            <a:latin typeface="Cambria Math" panose="02040503050406030204" pitchFamily="18" charset="0"/>
-                          </a:rPr>
-                          <m:t>𝑎</m:t>
-                        </m:r>
-                      </m:e>
-                      <m:sub>
-                        <m:r>
-                          <a:rPr lang="es-PE" sz="2000" b="0" i="1" smtClean="0">
-                            <a:latin typeface="Cambria Math" panose="02040503050406030204" pitchFamily="18" charset="0"/>
-                          </a:rPr>
-                          <m:t>𝑖</m:t>
-                        </m:r>
-                        <m:r>
-                          <a:rPr lang="es-PE" sz="2000" i="1">
-                            <a:latin typeface="Cambria Math" panose="02040503050406030204" pitchFamily="18" charset="0"/>
-                          </a:rPr>
-                          <m:t>𝑗</m:t>
-                        </m:r>
-                      </m:sub>
-                    </m:sSub>
-                  </m:oMath>
-                </a14:m>
-                <a:r>
-                  <a:rPr lang="es-MX" sz="2000" dirty="0"/>
-                  <a:t>, </a:t>
-                </a:r>
-                <a14:m>
-                  <m:oMath xmlns:m="http://schemas.openxmlformats.org/officeDocument/2006/math">
-                    <m:r>
-                      <a:rPr lang="es-PE" sz="2000" i="1">
-                        <a:latin typeface="Cambria Math" panose="02040503050406030204" pitchFamily="18" charset="0"/>
-                      </a:rPr>
-                      <m:t>𝑖</m:t>
-                    </m:r>
-                    <m:r>
-                      <a:rPr lang="es-PE" sz="2000" i="1">
-                        <a:latin typeface="Cambria Math" panose="02040503050406030204" pitchFamily="18" charset="0"/>
-                      </a:rPr>
-                      <m:t>=1,2,…,</m:t>
-                    </m:r>
-                    <m:r>
-                      <a:rPr lang="es-PE" sz="2000" b="0" i="1" smtClean="0">
-                        <a:latin typeface="Cambria Math" panose="02040503050406030204" pitchFamily="18" charset="0"/>
-                      </a:rPr>
-                      <m:t>𝑚</m:t>
-                    </m:r>
-                  </m:oMath>
-                </a14:m>
-                <a:r>
-                  <a:rPr lang="es-MX" sz="2000" dirty="0"/>
-                  <a:t> </a:t>
-                </a:r>
-                <a14:m>
-                  <m:oMath xmlns:m="http://schemas.openxmlformats.org/officeDocument/2006/math">
-                    <m:r>
-                      <a:rPr lang="es-PE" sz="2000" b="0" i="0" smtClean="0">
-                        <a:latin typeface="Cambria Math" panose="02040503050406030204" pitchFamily="18" charset="0"/>
-                      </a:rPr>
-                      <m:t>    </m:t>
-                    </m:r>
-                    <m:r>
-                      <a:rPr lang="es-PE" sz="2000" b="0" i="1" smtClean="0">
-                        <a:latin typeface="Cambria Math" panose="02040503050406030204" pitchFamily="18" charset="0"/>
-                      </a:rPr>
-                      <m:t>𝑗</m:t>
-                    </m:r>
-                    <m:r>
-                      <a:rPr lang="es-PE" sz="2000" i="1">
-                        <a:latin typeface="Cambria Math" panose="02040503050406030204" pitchFamily="18" charset="0"/>
-                      </a:rPr>
-                      <m:t>=1,</m:t>
-                    </m:r>
-                    <m:r>
-                      <a:rPr lang="es-PE" sz="2000" b="0" i="1" smtClean="0">
-                        <a:latin typeface="Cambria Math" panose="02040503050406030204" pitchFamily="18" charset="0"/>
-                      </a:rPr>
-                      <m:t>2,</m:t>
-                    </m:r>
-                    <m:r>
-                      <a:rPr lang="es-PE" sz="2000" i="1">
-                        <a:latin typeface="Cambria Math" panose="02040503050406030204" pitchFamily="18" charset="0"/>
-                      </a:rPr>
-                      <m:t>…,</m:t>
-                    </m:r>
-                    <m:r>
-                      <a:rPr lang="es-PE" sz="2000" i="1">
-                        <a:latin typeface="Cambria Math" panose="02040503050406030204" pitchFamily="18" charset="0"/>
-                      </a:rPr>
-                      <m:t>𝑛</m:t>
-                    </m:r>
-                  </m:oMath>
-                </a14:m>
-                <a:r>
-                  <a:rPr lang="es-MX" sz="2000" dirty="0"/>
-                  <a:t> describen un PL particular</a:t>
-                </a:r>
-              </a:p>
-              <a:p>
-                <a:pPr marL="285750" indent="-285750">
-                  <a:buFont typeface="Arial" panose="020B0604020202020204" pitchFamily="34" charset="0"/>
-                  <a:buChar char="•"/>
-                </a:pPr>
-                <a:r>
-                  <a:rPr lang="es-MX" sz="2000" dirty="0"/>
-                  <a:t>La forma estándar, </a:t>
-                </a:r>
-                <a14:m>
-                  <m:oMath xmlns:m="http://schemas.openxmlformats.org/officeDocument/2006/math">
-                    <m:sSub>
-                      <m:sSubPr>
-                        <m:ctrlPr>
-                          <a:rPr lang="es-MX" sz="2000" i="1">
-                            <a:latin typeface="Cambria Math" panose="02040503050406030204" pitchFamily="18" charset="0"/>
-                          </a:rPr>
-                        </m:ctrlPr>
-                      </m:sSubPr>
-                      <m:e>
-                        <m:r>
-                          <a:rPr lang="es-PE" sz="2000" i="1">
-                            <a:latin typeface="Cambria Math" panose="02040503050406030204" pitchFamily="18" charset="0"/>
-                          </a:rPr>
-                          <m:t>𝑏</m:t>
-                        </m:r>
-                      </m:e>
-                      <m:sub>
-                        <m:r>
-                          <a:rPr lang="es-PE" sz="2000" i="1">
-                            <a:latin typeface="Cambria Math" panose="02040503050406030204" pitchFamily="18" charset="0"/>
-                          </a:rPr>
-                          <m:t>𝑖</m:t>
-                        </m:r>
-                      </m:sub>
-                    </m:sSub>
-                    <m:r>
-                      <a:rPr lang="es-PE" sz="2000" b="0" i="0" smtClean="0">
-                        <a:latin typeface="Cambria Math" panose="02040503050406030204" pitchFamily="18" charset="0"/>
-                      </a:rPr>
-                      <m:t>≥0</m:t>
-                    </m:r>
-                  </m:oMath>
-                </a14:m>
-                <a:r>
-                  <a:rPr lang="es-MX" sz="2000" dirty="0"/>
-                  <a:t> para </a:t>
-                </a:r>
-                <a14:m>
-                  <m:oMath xmlns:m="http://schemas.openxmlformats.org/officeDocument/2006/math">
-                    <m:r>
-                      <a:rPr lang="es-PE" sz="2000" i="1">
-                        <a:latin typeface="Cambria Math" panose="02040503050406030204" pitchFamily="18" charset="0"/>
-                      </a:rPr>
-                      <m:t>𝑖</m:t>
-                    </m:r>
-                    <m:r>
-                      <a:rPr lang="es-PE" sz="2000" i="1">
-                        <a:latin typeface="Cambria Math" panose="02040503050406030204" pitchFamily="18" charset="0"/>
-                      </a:rPr>
-                      <m:t>=1,2,…,</m:t>
-                    </m:r>
-                    <m:r>
-                      <a:rPr lang="es-PE" sz="2000" i="1">
-                        <a:latin typeface="Cambria Math" panose="02040503050406030204" pitchFamily="18" charset="0"/>
-                      </a:rPr>
-                      <m:t>𝑚</m:t>
-                    </m:r>
-                  </m:oMath>
-                </a14:m>
-                <a:r>
-                  <a:rPr lang="es-MX" sz="2000" dirty="0"/>
-                  <a:t> </a:t>
-                </a:r>
-              </a:p>
-            </p:txBody>
-          </p:sp>
-        </mc:Choice>
-        <mc:Fallback xmlns="">
-          <p:sp>
-            <p:nvSpPr>
-              <p:cNvPr id="8" name="CuadroTexto 4">
-                <a:extLst>
-                  <a:ext uri="{FF2B5EF4-FFF2-40B4-BE49-F238E27FC236}">
-                    <a16:creationId xmlns:a16="http://schemas.microsoft.com/office/drawing/2014/main" id="{F31C097F-38DA-47AA-BEDF-8AA58B8B2848}"/>
-                  </a:ext>
-                </a:extLst>
-              </p:cNvPr>
-              <p:cNvSpPr txBox="1">
-                <a:spLocks noRot="1" noChangeAspect="1" noMove="1" noResize="1" noEditPoints="1" noAdjustHandles="1" noChangeArrowheads="1" noChangeShapeType="1" noTextEdit="1"/>
-              </p:cNvSpPr>
-              <p:nvPr/>
-            </p:nvSpPr>
-            <p:spPr>
-              <a:xfrm>
-                <a:off x="602191" y="3870417"/>
-                <a:ext cx="8002257" cy="1040349"/>
-              </a:xfrm>
-              <a:prstGeom prst="rect">
-                <a:avLst/>
-              </a:prstGeom>
-              <a:blipFill>
-                <a:blip r:embed="rId3"/>
-                <a:stretch>
-                  <a:fillRect l="-686" t="-1754" b="-10526"/>
-                </a:stretch>
-              </a:blipFill>
-            </p:spPr>
-            <p:txBody>
-              <a:bodyPr/>
-              <a:lstStyle/>
-              <a:p>
-                <a:r>
-                  <a:rPr lang="es-PE">
-                    <a:noFill/>
-                  </a:rPr>
-                  <a:t> </a:t>
-                </a:r>
-              </a:p>
-            </p:txBody>
-          </p:sp>
-        </mc:Fallback>
-      </mc:AlternateContent>
-    </p:spTree>
-    <p:extLst>
-      <p:ext uri="{BB962C8B-B14F-4D97-AF65-F5344CB8AC3E}">
-        <p14:creationId xmlns:p14="http://schemas.microsoft.com/office/powerpoint/2010/main" val="3329245721"/>
-      </p:ext>
-    </p:extLst>
-  </p:cSld>
-  <p:clrMapOvr>
-    <a:masterClrMapping/>
-  </p:clrMapOvr>
-  <p:transition spd="slow">
-    <p:fade/>
-  </p:transition>
-</p:sld>
-</file>
-
-<file path=ppt/slides/slide6.xml><?xml version="1.0" encoding="utf-8"?>
-<p:sld xmlns:a="http://schemas.openxmlformats.org/drawingml/2006/main" xmlns:r="http://schemas.openxmlformats.org/officeDocument/2006/relationships" xmlns:p="http://schemas.openxmlformats.org/presentationml/2006/main">
-  <p:cSld>
-    <p:spTree>
-      <p:nvGrpSpPr>
-        <p:cNvPr id="1" name=""/>
-        <p:cNvGrpSpPr/>
-        <p:nvPr/>
-      </p:nvGrpSpPr>
-      <p:grpSpPr>
-        <a:xfrm>
-          <a:off x="0" y="0"/>
-          <a:ext cx="0" cy="0"/>
-          <a:chOff x="0" y="0"/>
-          <a:chExt cx="0" cy="0"/>
-        </a:xfrm>
-      </p:grpSpPr>
-      <p:sp>
-        <p:nvSpPr>
-          <p:cNvPr id="2" name="Marcador de número de diapositiva 1"/>
-          <p:cNvSpPr>
-            <a:spLocks noGrp="1"/>
-          </p:cNvSpPr>
-          <p:nvPr>
-            <p:ph type="sldNum" sz="quarter" idx="12"/>
-          </p:nvPr>
-        </p:nvSpPr>
-        <p:spPr/>
-        <p:txBody>
-          <a:bodyPr/>
-          <a:lstStyle/>
-          <a:p>
-            <a:fld id="{64BD7E74-CBD2-4D88-9109-2EA8081AE675}" type="slidenum">
-              <a:rPr lang="es-ES" smtClean="0"/>
-              <a:pPr/>
-              <a:t>6</a:t>
-            </a:fld>
-            <a:endParaRPr lang="es-ES"/>
-          </a:p>
-        </p:txBody>
-      </p:sp>
-      <p:sp>
-        <p:nvSpPr>
-          <p:cNvPr id="6" name="Rectangle 3"/>
-          <p:cNvSpPr/>
-          <p:nvPr/>
-        </p:nvSpPr>
-        <p:spPr>
-          <a:xfrm>
-            <a:off x="3461473" y="2996818"/>
-            <a:ext cx="1429392" cy="872476"/>
-          </a:xfrm>
-          <a:prstGeom prst="rect">
-            <a:avLst/>
-          </a:prstGeom>
-          <a:solidFill>
-            <a:schemeClr val="tx2">
-              <a:lumMod val="40000"/>
-              <a:lumOff val="60000"/>
-              <a:alpha val="17000"/>
-            </a:schemeClr>
-          </a:solidFill>
-          <a:ln>
-            <a:solidFill>
-              <a:schemeClr val="bg1"/>
-            </a:solidFill>
-          </a:ln>
-        </p:spPr>
-        <p:style>
-          <a:lnRef idx="2">
-            <a:schemeClr val="accent1">
-              <a:shade val="50000"/>
-            </a:schemeClr>
-          </a:lnRef>
-          <a:fillRef idx="1">
-            <a:schemeClr val="accent1"/>
-          </a:fillRef>
-          <a:effectRef idx="0">
-            <a:schemeClr val="accent1"/>
-          </a:effectRef>
-          <a:fontRef idx="minor">
-            <a:schemeClr val="lt1"/>
-          </a:fontRef>
-        </p:style>
-        <p:txBody>
-          <a:bodyPr rtlCol="0" anchor="ctr"/>
-          <a:lstStyle/>
-          <a:p>
-            <a:pPr algn="ctr"/>
-            <a:endParaRPr lang="en-US"/>
-          </a:p>
-        </p:txBody>
-      </p:sp>
-      <p:sp>
-        <p:nvSpPr>
-          <p:cNvPr id="8" name="Rectangle 9"/>
-          <p:cNvSpPr/>
-          <p:nvPr/>
-        </p:nvSpPr>
-        <p:spPr>
-          <a:xfrm>
-            <a:off x="4887766" y="2996818"/>
-            <a:ext cx="1475975" cy="872476"/>
-          </a:xfrm>
-          <a:prstGeom prst="rect">
-            <a:avLst/>
-          </a:prstGeom>
-          <a:solidFill>
-            <a:schemeClr val="tx2">
-              <a:lumMod val="40000"/>
-              <a:lumOff val="60000"/>
-              <a:alpha val="17000"/>
-            </a:schemeClr>
-          </a:solidFill>
-          <a:ln>
-            <a:solidFill>
-              <a:schemeClr val="bg1"/>
-            </a:solidFill>
-          </a:ln>
-        </p:spPr>
-        <p:style>
-          <a:lnRef idx="2">
-            <a:schemeClr val="accent1">
-              <a:shade val="50000"/>
-            </a:schemeClr>
-          </a:lnRef>
-          <a:fillRef idx="1">
-            <a:schemeClr val="accent1"/>
-          </a:fillRef>
-          <a:effectRef idx="0">
-            <a:schemeClr val="accent1"/>
-          </a:effectRef>
-          <a:fontRef idx="minor">
-            <a:schemeClr val="lt1"/>
-          </a:fontRef>
-        </p:style>
-        <p:txBody>
-          <a:bodyPr rtlCol="0" anchor="ctr"/>
-          <a:lstStyle/>
-          <a:p>
-            <a:pPr algn="ctr"/>
-            <a:endParaRPr lang="en-US"/>
-          </a:p>
-        </p:txBody>
-      </p:sp>
-      <p:sp>
-        <p:nvSpPr>
-          <p:cNvPr id="26" name="Hexagon 9"/>
-          <p:cNvSpPr/>
-          <p:nvPr/>
-        </p:nvSpPr>
-        <p:spPr>
-          <a:xfrm>
-            <a:off x="2295478" y="1358596"/>
-            <a:ext cx="1802054" cy="1463387"/>
-          </a:xfrm>
-          <a:prstGeom prst="hexagon">
-            <a:avLst/>
-          </a:prstGeom>
-          <a:ln/>
-        </p:spPr>
-        <p:style>
-          <a:lnRef idx="1">
-            <a:schemeClr val="dk1"/>
-          </a:lnRef>
-          <a:fillRef idx="2">
-            <a:schemeClr val="dk1"/>
-          </a:fillRef>
-          <a:effectRef idx="1">
-            <a:schemeClr val="dk1"/>
-          </a:effectRef>
-          <a:fontRef idx="minor">
-            <a:schemeClr val="dk1"/>
-          </a:fontRef>
-        </p:style>
-        <p:txBody>
-          <a:bodyPr rtlCol="0" anchor="ctr"/>
-          <a:lstStyle/>
-          <a:p>
-            <a:pPr algn="ctr"/>
-            <a:r>
-              <a:rPr lang="en-US" sz="1200" dirty="0">
-                <a:solidFill>
-                  <a:schemeClr val="tx1"/>
-                </a:solidFill>
-                <a:latin typeface="Oswald" panose="02000506000000020004" pitchFamily="50"/>
-              </a:rPr>
-              <a:t>Power System Optimization</a:t>
-            </a:r>
-            <a:endParaRPr lang="en-US" sz="900" dirty="0">
-              <a:solidFill>
-                <a:schemeClr val="tx1"/>
-              </a:solidFill>
-              <a:latin typeface="Oswald" panose="02000506000000020004" pitchFamily="50"/>
-            </a:endParaRPr>
-          </a:p>
-        </p:txBody>
-      </p:sp>
-      <p:sp>
-        <p:nvSpPr>
-          <p:cNvPr id="30" name="Hexagon 9"/>
-          <p:cNvSpPr/>
-          <p:nvPr/>
-        </p:nvSpPr>
-        <p:spPr>
-          <a:xfrm>
-            <a:off x="3793779" y="2158930"/>
-            <a:ext cx="1802054" cy="1463387"/>
-          </a:xfrm>
-          <a:prstGeom prst="hexagon">
-            <a:avLst/>
-          </a:prstGeom>
-          <a:ln/>
-        </p:spPr>
-        <p:style>
-          <a:lnRef idx="1">
-            <a:schemeClr val="accent6"/>
-          </a:lnRef>
-          <a:fillRef idx="2">
-            <a:schemeClr val="accent6"/>
-          </a:fillRef>
-          <a:effectRef idx="1">
-            <a:schemeClr val="accent6"/>
-          </a:effectRef>
-          <a:fontRef idx="minor">
-            <a:schemeClr val="dk1"/>
-          </a:fontRef>
-        </p:style>
-        <p:txBody>
-          <a:bodyPr rtlCol="0" anchor="ctr"/>
-          <a:lstStyle/>
-          <a:p>
-            <a:pPr algn="ctr"/>
-            <a:r>
-              <a:rPr lang="en-US" sz="2400" dirty="0">
-                <a:solidFill>
-                  <a:schemeClr val="tx1"/>
-                </a:solidFill>
-                <a:latin typeface="Oswald" panose="02000506000000020004" pitchFamily="50"/>
-              </a:rPr>
-              <a:t>Outline</a:t>
-            </a:r>
-            <a:endParaRPr lang="en-US" sz="1400" dirty="0">
-              <a:solidFill>
-                <a:schemeClr val="tx1"/>
-              </a:solidFill>
-              <a:latin typeface="Oswald" panose="02000506000000020004" pitchFamily="50"/>
-            </a:endParaRPr>
-          </a:p>
-        </p:txBody>
-      </p:sp>
-      <p:sp>
-        <p:nvSpPr>
-          <p:cNvPr id="31" name="Hexagon 9"/>
-          <p:cNvSpPr/>
-          <p:nvPr/>
-        </p:nvSpPr>
-        <p:spPr>
-          <a:xfrm>
-            <a:off x="2293624" y="2927791"/>
-            <a:ext cx="1802054" cy="1463387"/>
-          </a:xfrm>
-          <a:prstGeom prst="hexagon">
-            <a:avLst/>
-          </a:prstGeom>
-          <a:ln/>
-        </p:spPr>
-        <p:style>
-          <a:lnRef idx="1">
-            <a:schemeClr val="accent1"/>
-          </a:lnRef>
-          <a:fillRef idx="2">
-            <a:schemeClr val="accent1"/>
-          </a:fillRef>
-          <a:effectRef idx="1">
-            <a:schemeClr val="accent1"/>
-          </a:effectRef>
-          <a:fontRef idx="minor">
-            <a:schemeClr val="dk1"/>
-          </a:fontRef>
-        </p:style>
-        <p:txBody>
-          <a:bodyPr rtlCol="0" anchor="ctr"/>
-          <a:lstStyle/>
-          <a:p>
-            <a:pPr algn="ctr"/>
-            <a:r>
-              <a:rPr lang="en-US" sz="1200" dirty="0">
-                <a:solidFill>
-                  <a:schemeClr val="tx1"/>
-                </a:solidFill>
-                <a:latin typeface="Oswald" panose="02000506000000020004" pitchFamily="50"/>
-              </a:rPr>
-              <a:t>Semidefinite Relaxation</a:t>
-            </a:r>
-          </a:p>
-          <a:p>
-            <a:pPr algn="ctr"/>
-            <a:r>
-              <a:rPr lang="en-US" sz="1200" dirty="0">
-                <a:solidFill>
-                  <a:schemeClr val="tx1"/>
-                </a:solidFill>
-                <a:latin typeface="Oswald" panose="02000506000000020004" pitchFamily="50"/>
-              </a:rPr>
-              <a:t> (SDP)</a:t>
-            </a:r>
-          </a:p>
-        </p:txBody>
-      </p:sp>
-      <p:sp>
-        <p:nvSpPr>
-          <p:cNvPr id="33" name="Hexagon 9"/>
-          <p:cNvSpPr/>
-          <p:nvPr/>
-        </p:nvSpPr>
-        <p:spPr>
-          <a:xfrm>
-            <a:off x="5292080" y="1358596"/>
-            <a:ext cx="1802054" cy="1463387"/>
-          </a:xfrm>
-          <a:prstGeom prst="hexagon">
-            <a:avLst/>
-          </a:prstGeom>
-          <a:ln/>
-        </p:spPr>
-        <p:style>
-          <a:lnRef idx="1">
-            <a:schemeClr val="accent2"/>
-          </a:lnRef>
-          <a:fillRef idx="2">
-            <a:schemeClr val="accent2"/>
-          </a:fillRef>
-          <a:effectRef idx="1">
-            <a:schemeClr val="accent2"/>
-          </a:effectRef>
-          <a:fontRef idx="minor">
-            <a:schemeClr val="dk1"/>
-          </a:fontRef>
-        </p:style>
-        <p:txBody>
-          <a:bodyPr rtlCol="0" anchor="ctr"/>
-          <a:lstStyle/>
-          <a:p>
-            <a:pPr algn="ctr"/>
-            <a:r>
-              <a:rPr lang="en-US" sz="1200" dirty="0">
-                <a:solidFill>
-                  <a:schemeClr val="tx1"/>
-                </a:solidFill>
-                <a:latin typeface="Oswald" panose="02000506000000020004" pitchFamily="50"/>
-              </a:rPr>
-              <a:t>Results</a:t>
-            </a:r>
-          </a:p>
-        </p:txBody>
-      </p:sp>
-      <p:sp>
-        <p:nvSpPr>
-          <p:cNvPr id="34" name="Hexagon 9"/>
-          <p:cNvSpPr/>
-          <p:nvPr/>
-        </p:nvSpPr>
-        <p:spPr>
-          <a:xfrm>
-            <a:off x="3793779" y="3690957"/>
-            <a:ext cx="1802054" cy="1463387"/>
-          </a:xfrm>
-          <a:prstGeom prst="hexagon">
-            <a:avLst/>
-          </a:prstGeom>
-          <a:ln/>
-        </p:spPr>
-        <p:style>
-          <a:lnRef idx="1">
-            <a:schemeClr val="accent4"/>
-          </a:lnRef>
-          <a:fillRef idx="2">
-            <a:schemeClr val="accent4"/>
-          </a:fillRef>
-          <a:effectRef idx="1">
-            <a:schemeClr val="accent4"/>
-          </a:effectRef>
-          <a:fontRef idx="minor">
-            <a:schemeClr val="dk1"/>
-          </a:fontRef>
-        </p:style>
-        <p:txBody>
-          <a:bodyPr rtlCol="0" anchor="ctr"/>
-          <a:lstStyle/>
-          <a:p>
-            <a:pPr algn="ctr"/>
-            <a:r>
-              <a:rPr lang="en-US" sz="1200" dirty="0">
-                <a:solidFill>
-                  <a:schemeClr val="tx1"/>
-                </a:solidFill>
-                <a:latin typeface="Oswald" panose="02000506000000020004" pitchFamily="50"/>
-              </a:rPr>
-              <a:t>A SDP Formulation for the AC-OPF</a:t>
-            </a:r>
-          </a:p>
-        </p:txBody>
-      </p:sp>
-      <p:sp>
-        <p:nvSpPr>
-          <p:cNvPr id="37" name="Hexagon 9"/>
-          <p:cNvSpPr/>
-          <p:nvPr/>
-        </p:nvSpPr>
-        <p:spPr>
-          <a:xfrm>
-            <a:off x="5292080" y="2924944"/>
-            <a:ext cx="1802054" cy="1463387"/>
-          </a:xfrm>
-          <a:prstGeom prst="hexagon">
-            <a:avLst/>
-          </a:prstGeom>
-          <a:ln/>
-        </p:spPr>
-        <p:style>
-          <a:lnRef idx="1">
-            <a:schemeClr val="accent3"/>
-          </a:lnRef>
-          <a:fillRef idx="2">
-            <a:schemeClr val="accent3"/>
-          </a:fillRef>
-          <a:effectRef idx="1">
-            <a:schemeClr val="accent3"/>
-          </a:effectRef>
-          <a:fontRef idx="minor">
-            <a:schemeClr val="dk1"/>
-          </a:fontRef>
-        </p:style>
-        <p:txBody>
-          <a:bodyPr rtlCol="0" anchor="ctr"/>
-          <a:lstStyle/>
-          <a:p>
-            <a:pPr algn="ctr"/>
-            <a:r>
-              <a:rPr lang="en-US" sz="1200" dirty="0">
-                <a:solidFill>
-                  <a:schemeClr val="tx1"/>
-                </a:solidFill>
-                <a:latin typeface="Oswald" panose="02000506000000020004" pitchFamily="50"/>
-              </a:rPr>
-              <a:t>ACTNEP &amp; RPP</a:t>
-            </a:r>
-          </a:p>
-        </p:txBody>
-      </p:sp>
-    </p:spTree>
-    <p:extLst>
-      <p:ext uri="{BB962C8B-B14F-4D97-AF65-F5344CB8AC3E}">
-        <p14:creationId xmlns:p14="http://schemas.microsoft.com/office/powerpoint/2010/main" val="1870165306"/>
-      </p:ext>
-    </p:extLst>
-  </p:cSld>
-  <p:clrMapOvr>
-    <a:masterClrMapping/>
-  </p:clrMapOvr>
-  <mc:AlternateContent xmlns:mc="http://schemas.openxmlformats.org/markup-compatibility/2006" xmlns:p14="http://schemas.microsoft.com/office/powerpoint/2010/main">
-    <mc:Choice Requires="p14">
-      <p:transition spd="med" p14:dur="700">
-        <p:fade/>
-      </p:transition>
-    </mc:Choice>
-    <mc:Fallback xmlns="">
-      <p:transition spd="med">
-        <p:fade/>
-      </p:transition>
-    </mc:Fallback>
-  </mc:AlternateContent>
-</p:sld>
-</file>
-
-<file path=ppt/slides/slide7.xml><?xml version="1.0" encoding="utf-8"?>
-<p:sld xmlns:a="http://schemas.openxmlformats.org/drawingml/2006/main" xmlns:r="http://schemas.openxmlformats.org/officeDocument/2006/relationships" xmlns:p="http://schemas.openxmlformats.org/presentationml/2006/main">
-  <p:cSld>
-    <p:spTree>
-      <p:nvGrpSpPr>
-        <p:cNvPr id="1" name=""/>
-        <p:cNvGrpSpPr/>
-        <p:nvPr/>
-      </p:nvGrpSpPr>
-      <p:grpSpPr>
-        <a:xfrm>
-          <a:off x="0" y="0"/>
-          <a:ext cx="0" cy="0"/>
-          <a:chOff x="0" y="0"/>
-          <a:chExt cx="0" cy="0"/>
-        </a:xfrm>
-      </p:grpSpPr>
-      <p:sp>
-        <p:nvSpPr>
           <p:cNvPr id="3" name="Marcador de número de diapositiva 2"/>
           <p:cNvSpPr>
             <a:spLocks noGrp="1"/>
@@ -7524,7 +7679,7 @@
             <a:fld id="{64BD7E74-CBD2-4D88-9109-2EA8081AE675}" type="slidenum">
               <a:rPr lang="es-ES" smtClean="0"/>
               <a:pPr/>
-              <a:t>7</a:t>
+              <a:t>5</a:t>
             </a:fld>
             <a:endParaRPr lang="es-ES"/>
           </a:p>

</xml_diff>